<commit_message>
working on updating les07
</commit_message>
<xml_diff>
--- a/doc/intro/slides/lesson_07_jsf.pptx
+++ b/doc/intro/slides/lesson_07_jsf.pptx
@@ -5,7 +5,7 @@
     <p:sldMasterId id="2147483648" r:id="rId1"/>
   </p:sldMasterIdLst>
   <p:notesMasterIdLst>
-    <p:notesMasterId r:id="rId60"/>
+    <p:notesMasterId r:id="rId66"/>
   </p:notesMasterIdLst>
   <p:sldIdLst>
     <p:sldId id="256" r:id="rId2"/>
@@ -53,19 +53,25 @@
     <p:sldId id="332" r:id="rId44"/>
     <p:sldId id="333" r:id="rId45"/>
     <p:sldId id="335" r:id="rId46"/>
-    <p:sldId id="326" r:id="rId47"/>
-    <p:sldId id="336" r:id="rId48"/>
-    <p:sldId id="337" r:id="rId49"/>
-    <p:sldId id="338" r:id="rId50"/>
-    <p:sldId id="339" r:id="rId51"/>
-    <p:sldId id="340" r:id="rId52"/>
-    <p:sldId id="341" r:id="rId53"/>
-    <p:sldId id="342" r:id="rId54"/>
-    <p:sldId id="345" r:id="rId55"/>
-    <p:sldId id="424" r:id="rId56"/>
-    <p:sldId id="430" r:id="rId57"/>
-    <p:sldId id="334" r:id="rId58"/>
-    <p:sldId id="271" r:id="rId59"/>
+    <p:sldId id="431" r:id="rId47"/>
+    <p:sldId id="433" r:id="rId48"/>
+    <p:sldId id="432" r:id="rId49"/>
+    <p:sldId id="436" r:id="rId50"/>
+    <p:sldId id="434" r:id="rId51"/>
+    <p:sldId id="435" r:id="rId52"/>
+    <p:sldId id="326" r:id="rId53"/>
+    <p:sldId id="336" r:id="rId54"/>
+    <p:sldId id="337" r:id="rId55"/>
+    <p:sldId id="338" r:id="rId56"/>
+    <p:sldId id="339" r:id="rId57"/>
+    <p:sldId id="340" r:id="rId58"/>
+    <p:sldId id="341" r:id="rId59"/>
+    <p:sldId id="342" r:id="rId60"/>
+    <p:sldId id="345" r:id="rId61"/>
+    <p:sldId id="424" r:id="rId62"/>
+    <p:sldId id="430" r:id="rId63"/>
+    <p:sldId id="334" r:id="rId64"/>
+    <p:sldId id="271" r:id="rId65"/>
   </p:sldIdLst>
   <p:sldSz cx="12192000" cy="6858000"/>
   <p:notesSz cx="6858000" cy="9144000"/>
@@ -254,7 +260,7 @@
           <a:p>
             <a:fld id="{9B5B52BA-3295-0343-9E28-A260A811DD10}" type="datetimeFigureOut">
               <a:rPr lang="en-US" smtClean="0"/>
-              <a:t>2/18/19</a:t>
+              <a:t>2/20/19</a:t>
             </a:fld>
             <a:endParaRPr lang="en-US"/>
           </a:p>
@@ -650,7 +656,7 @@
           <a:p>
             <a:fld id="{04F1D4A2-813C-F741-B481-C92B3A596030}" type="datetimeFigureOut">
               <a:rPr lang="en-US" smtClean="0"/>
-              <a:t>2/18/19</a:t>
+              <a:t>2/20/19</a:t>
             </a:fld>
             <a:endParaRPr lang="en-US"/>
           </a:p>
@@ -818,7 +824,7 @@
           <a:p>
             <a:fld id="{04F1D4A2-813C-F741-B481-C92B3A596030}" type="datetimeFigureOut">
               <a:rPr lang="en-US" smtClean="0"/>
-              <a:t>2/18/19</a:t>
+              <a:t>2/20/19</a:t>
             </a:fld>
             <a:endParaRPr lang="en-US"/>
           </a:p>
@@ -996,7 +1002,7 @@
           <a:p>
             <a:fld id="{04F1D4A2-813C-F741-B481-C92B3A596030}" type="datetimeFigureOut">
               <a:rPr lang="en-US" smtClean="0"/>
-              <a:t>2/18/19</a:t>
+              <a:t>2/20/19</a:t>
             </a:fld>
             <a:endParaRPr lang="en-US"/>
           </a:p>
@@ -1175,7 +1181,7 @@
           <a:p>
             <a:fld id="{04F1D4A2-813C-F741-B481-C92B3A596030}" type="datetimeFigureOut">
               <a:rPr lang="en-US" smtClean="0"/>
-              <a:t>2/18/19</a:t>
+              <a:t>2/20/19</a:t>
             </a:fld>
             <a:endParaRPr lang="en-US"/>
           </a:p>
@@ -1420,7 +1426,7 @@
           <a:p>
             <a:fld id="{04F1D4A2-813C-F741-B481-C92B3A596030}" type="datetimeFigureOut">
               <a:rPr lang="en-US" smtClean="0"/>
-              <a:t>2/18/19</a:t>
+              <a:t>2/20/19</a:t>
             </a:fld>
             <a:endParaRPr lang="en-US"/>
           </a:p>
@@ -1649,7 +1655,7 @@
           <a:p>
             <a:fld id="{04F1D4A2-813C-F741-B481-C92B3A596030}" type="datetimeFigureOut">
               <a:rPr lang="en-US" smtClean="0"/>
-              <a:t>2/18/19</a:t>
+              <a:t>2/20/19</a:t>
             </a:fld>
             <a:endParaRPr lang="en-US"/>
           </a:p>
@@ -2013,7 +2019,7 @@
           <a:p>
             <a:fld id="{04F1D4A2-813C-F741-B481-C92B3A596030}" type="datetimeFigureOut">
               <a:rPr lang="en-US" smtClean="0"/>
-              <a:t>2/18/19</a:t>
+              <a:t>2/20/19</a:t>
             </a:fld>
             <a:endParaRPr lang="en-US"/>
           </a:p>
@@ -2130,7 +2136,7 @@
           <a:p>
             <a:fld id="{04F1D4A2-813C-F741-B481-C92B3A596030}" type="datetimeFigureOut">
               <a:rPr lang="en-US" smtClean="0"/>
-              <a:t>2/18/19</a:t>
+              <a:t>2/20/19</a:t>
             </a:fld>
             <a:endParaRPr lang="en-US"/>
           </a:p>
@@ -2225,7 +2231,7 @@
           <a:p>
             <a:fld id="{04F1D4A2-813C-F741-B481-C92B3A596030}" type="datetimeFigureOut">
               <a:rPr lang="en-US" smtClean="0"/>
-              <a:t>2/18/19</a:t>
+              <a:t>2/20/19</a:t>
             </a:fld>
             <a:endParaRPr lang="en-US"/>
           </a:p>
@@ -2500,7 +2506,7 @@
           <a:p>
             <a:fld id="{04F1D4A2-813C-F741-B481-C92B3A596030}" type="datetimeFigureOut">
               <a:rPr lang="en-US" smtClean="0"/>
-              <a:t>2/18/19</a:t>
+              <a:t>2/20/19</a:t>
             </a:fld>
             <a:endParaRPr lang="en-US"/>
           </a:p>
@@ -2752,7 +2758,7 @@
           <a:p>
             <a:fld id="{04F1D4A2-813C-F741-B481-C92B3A596030}" type="datetimeFigureOut">
               <a:rPr lang="en-US" smtClean="0"/>
-              <a:t>2/18/19</a:t>
+              <a:t>2/20/19</a:t>
             </a:fld>
             <a:endParaRPr lang="en-US"/>
           </a:p>
@@ -2963,7 +2969,7 @@
           <a:p>
             <a:fld id="{04F1D4A2-813C-F741-B481-C92B3A596030}" type="datetimeFigureOut">
               <a:rPr lang="en-US" smtClean="0"/>
-              <a:t>2/18/19</a:t>
+              <a:t>2/20/19</a:t>
             </a:fld>
             <a:endParaRPr lang="en-US"/>
           </a:p>
@@ -4176,7 +4182,7 @@
           <a:p>
             <a:r>
               <a:rPr lang="en-US" dirty="0"/>
-              <a:t>HTTP message</a:t>
+              <a:t>HTTP Message</a:t>
             </a:r>
           </a:p>
         </p:txBody>
@@ -4477,7 +4483,7 @@
           <a:p>
             <a:r>
               <a:rPr lang="en-US" dirty="0"/>
-              <a:t>HTTP Server application</a:t>
+              <a:t>HTTP Server Application</a:t>
             </a:r>
           </a:p>
         </p:txBody>
@@ -7056,7 +7062,7 @@
           <a:p>
             <a:r>
               <a:rPr lang="en-US" dirty="0"/>
-              <a:t>Need experience with </a:t>
+              <a:t>Need some experience with </a:t>
             </a:r>
             <a:r>
               <a:rPr lang="en-US" i="1" dirty="0"/>
@@ -7227,15 +7233,7 @@
           <a:p>
             <a:r>
               <a:rPr lang="en-US" dirty="0"/>
-              <a:t>Different </a:t>
-            </a:r>
-            <a:r>
-              <a:rPr lang="en-US" dirty="0" err="1"/>
-              <a:t>templating</a:t>
-            </a:r>
-            <a:r>
-              <a:rPr lang="en-US" dirty="0"/>
-              <a:t> technologies, using servlets underneath</a:t>
+              <a:t>Different template technologies, using servlets underneath</a:t>
             </a:r>
           </a:p>
           <a:p>
@@ -10186,18 +10184,52 @@
       </p:grpSpPr>
       <p:sp>
         <p:nvSpPr>
-          <p:cNvPr id="2" name="Title 1"/>
+          <p:cNvPr id="2" name="Title 1">
+            <a:extLst>
+              <a:ext uri="{FF2B5EF4-FFF2-40B4-BE49-F238E27FC236}">
+                <a16:creationId xmlns:a16="http://schemas.microsoft.com/office/drawing/2014/main" id="{EE68D4DE-5A81-E148-8D5E-BAF17947EBB3}"/>
+              </a:ext>
+            </a:extLst>
+          </p:cNvPr>
           <p:cNvSpPr>
             <a:spLocks noGrp="1"/>
           </p:cNvSpPr>
           <p:nvPr>
             <p:ph type="title"/>
+          </p:nvPr>
+        </p:nvSpPr>
+        <p:spPr/>
+        <p:txBody>
+          <a:bodyPr/>
+          <a:lstStyle/>
+          <a:p>
+            <a:r>
+              <a:rPr lang="en-US" dirty="0"/>
+              <a:t>JSF Managed Beans</a:t>
+            </a:r>
+          </a:p>
+        </p:txBody>
+      </p:sp>
+      <p:sp>
+        <p:nvSpPr>
+          <p:cNvPr id="3" name="Content Placeholder 2">
+            <a:extLst>
+              <a:ext uri="{FF2B5EF4-FFF2-40B4-BE49-F238E27FC236}">
+                <a16:creationId xmlns:a16="http://schemas.microsoft.com/office/drawing/2014/main" id="{A9BDF155-A129-CA4F-9F14-4C9DD9947E74}"/>
+              </a:ext>
+            </a:extLst>
+          </p:cNvPr>
+          <p:cNvSpPr>
+            <a:spLocks noGrp="1"/>
+          </p:cNvSpPr>
+          <p:nvPr>
+            <p:ph idx="1"/>
           </p:nvPr>
         </p:nvSpPr>
         <p:spPr>
           <a:xfrm>
-            <a:off x="838200" y="3002307"/>
-            <a:ext cx="10515600" cy="1325563"/>
+            <a:off x="289560" y="1825624"/>
+            <a:ext cx="11673840" cy="4864736"/>
           </a:xfrm>
         </p:spPr>
         <p:txBody>
@@ -10206,7 +10238,103 @@
           <a:p>
             <a:r>
               <a:rPr lang="en-US" dirty="0"/>
-              <a:t>Docker</a:t>
+              <a:t>From XHTML, we can call Java code, inside </a:t>
+            </a:r>
+            <a:r>
+              <a:rPr lang="en-US" b="1" dirty="0"/>
+              <a:t>#{} </a:t>
+            </a:r>
+            <a:r>
+              <a:rPr lang="en-US" dirty="0"/>
+              <a:t>blocks in the tag attributes</a:t>
+            </a:r>
+          </a:p>
+          <a:p>
+            <a:pPr lvl="1"/>
+            <a:r>
+              <a:rPr lang="en-US" dirty="0"/>
+              <a:t>“</a:t>
+            </a:r>
+            <a:r>
+              <a:rPr lang="en-US" i="1" dirty="0"/>
+              <a:t>value</a:t>
+            </a:r>
+            <a:r>
+              <a:rPr lang="en-US" dirty="0"/>
+              <a:t>” can be read when generating HTML server-side</a:t>
+            </a:r>
+          </a:p>
+          <a:p>
+            <a:pPr lvl="1"/>
+            <a:r>
+              <a:rPr lang="en-US" dirty="0"/>
+              <a:t>“</a:t>
+            </a:r>
+            <a:r>
+              <a:rPr lang="en-US" i="1" dirty="0"/>
+              <a:t>action</a:t>
+            </a:r>
+            <a:r>
+              <a:rPr lang="en-US" dirty="0"/>
+              <a:t>” can be executed once server receives HTTP POSTs</a:t>
+            </a:r>
+          </a:p>
+          <a:p>
+            <a:pPr algn="just"/>
+            <a:r>
+              <a:rPr lang="en-US" dirty="0"/>
+              <a:t>JSF uses special beans as a bridge between the HTML GUI and the business logic (</a:t>
+            </a:r>
+            <a:r>
+              <a:rPr lang="en-US" dirty="0" err="1"/>
+              <a:t>eg</a:t>
+            </a:r>
+            <a:r>
+              <a:rPr lang="en-US" dirty="0"/>
+              <a:t> EJBs)</a:t>
+            </a:r>
+          </a:p>
+          <a:p>
+            <a:pPr algn="just"/>
+            <a:r>
+              <a:rPr lang="en-US" dirty="0"/>
+              <a:t>Different kinds of JSF-Beans, but we will just need 2:</a:t>
+            </a:r>
+          </a:p>
+          <a:p>
+            <a:pPr marL="971550" lvl="1" indent="-514350" algn="just">
+              <a:buFont typeface="+mj-lt"/>
+              <a:buAutoNum type="arabicPeriod"/>
+            </a:pPr>
+            <a:r>
+              <a:rPr lang="en-US" i="1" dirty="0"/>
+              <a:t>@</a:t>
+            </a:r>
+            <a:r>
+              <a:rPr lang="en-US" i="1" dirty="0" err="1"/>
+              <a:t>RequestScoped</a:t>
+            </a:r>
+            <a:r>
+              <a:rPr lang="en-US" dirty="0"/>
+              <a:t>, created for each HTTP request</a:t>
+            </a:r>
+          </a:p>
+          <a:p>
+            <a:pPr marL="971550" lvl="1" indent="-514350" algn="just">
+              <a:buFont typeface="+mj-lt"/>
+              <a:buAutoNum type="arabicPeriod"/>
+            </a:pPr>
+            <a:r>
+              <a:rPr lang="en-US" i="1" dirty="0"/>
+              <a:t>@</a:t>
+            </a:r>
+            <a:r>
+              <a:rPr lang="en-US" i="1" dirty="0" err="1"/>
+              <a:t>SessionScoped</a:t>
+            </a:r>
+            <a:r>
+              <a:rPr lang="en-US" dirty="0"/>
+              <a:t>, created for each user session (based on cookies)</a:t>
             </a:r>
           </a:p>
         </p:txBody>
@@ -10214,7 +10342,7 @@
     </p:spTree>
     <p:extLst>
       <p:ext uri="{BB962C8B-B14F-4D97-AF65-F5344CB8AC3E}">
-        <p14:creationId xmlns:p14="http://schemas.microsoft.com/office/powerpoint/2010/main" val="3402842063"/>
+        <p14:creationId xmlns:p14="http://schemas.microsoft.com/office/powerpoint/2010/main" val="74358614"/>
       </p:ext>
     </p:extLst>
   </p:cSld>
@@ -10243,149 +10371,125 @@
       </p:grpSpPr>
       <p:sp>
         <p:nvSpPr>
-          <p:cNvPr id="2" name="Title 1"/>
+          <p:cNvPr id="2" name="Title 1">
+            <a:extLst>
+              <a:ext uri="{FF2B5EF4-FFF2-40B4-BE49-F238E27FC236}">
+                <a16:creationId xmlns:a16="http://schemas.microsoft.com/office/drawing/2014/main" id="{35DFBC08-02EB-7A4A-A4F9-8F72ED0371E7}"/>
+              </a:ext>
+            </a:extLst>
+          </p:cNvPr>
           <p:cNvSpPr>
             <a:spLocks noGrp="1"/>
           </p:cNvSpPr>
           <p:nvPr>
             <p:ph type="title"/>
+          </p:nvPr>
+        </p:nvSpPr>
+        <p:spPr/>
+        <p:txBody>
+          <a:bodyPr/>
+          <a:lstStyle/>
+          <a:p>
+            <a:r>
+              <a:rPr lang="en-US" dirty="0"/>
+              <a:t>Cont.</a:t>
+            </a:r>
+          </a:p>
+        </p:txBody>
+      </p:sp>
+      <p:sp>
+        <p:nvSpPr>
+          <p:cNvPr id="3" name="Content Placeholder 2">
+            <a:extLst>
+              <a:ext uri="{FF2B5EF4-FFF2-40B4-BE49-F238E27FC236}">
+                <a16:creationId xmlns:a16="http://schemas.microsoft.com/office/drawing/2014/main" id="{CA3FD6F3-B310-FB43-84CC-F6A7C6C4C729}"/>
+              </a:ext>
+            </a:extLst>
+          </p:cNvPr>
+          <p:cNvSpPr>
+            <a:spLocks noGrp="1"/>
+          </p:cNvSpPr>
+          <p:nvPr>
+            <p:ph idx="1"/>
           </p:nvPr>
         </p:nvSpPr>
         <p:spPr>
           <a:xfrm>
-            <a:off x="314793" y="365125"/>
-            <a:ext cx="11489961" cy="1325563"/>
+            <a:off x="297180" y="1795144"/>
+            <a:ext cx="11650980" cy="4895216"/>
           </a:xfrm>
         </p:spPr>
         <p:txBody>
           <a:bodyPr>
-            <a:normAutofit/>
+            <a:normAutofit lnSpcReduction="10000"/>
           </a:bodyPr>
           <a:lstStyle/>
           <a:p>
             <a:r>
               <a:rPr lang="en-US" dirty="0"/>
-              <a:t>Deploy OS Images </a:t>
-            </a:r>
-          </a:p>
-        </p:txBody>
-      </p:sp>
-      <p:sp>
-        <p:nvSpPr>
-          <p:cNvPr id="3" name="Content Placeholder 2"/>
-          <p:cNvSpPr>
-            <a:spLocks noGrp="1"/>
-          </p:cNvSpPr>
-          <p:nvPr>
-            <p:ph idx="1"/>
-          </p:nvPr>
-        </p:nvSpPr>
-        <p:spPr>
-          <a:xfrm>
-            <a:off x="314793" y="1825624"/>
-            <a:ext cx="11699823" cy="4882473"/>
-          </a:xfrm>
-        </p:spPr>
-        <p:txBody>
-          <a:bodyPr>
-            <a:normAutofit fontScale="85000" lnSpcReduction="10000"/>
-          </a:bodyPr>
-          <a:lstStyle/>
-          <a:p>
-            <a:r>
-              <a:rPr lang="en-US" dirty="0"/>
-              <a:t>When developing applications, not limit to just package your code </a:t>
+              <a:t>To be able to be referenced from XHTML, the beans need to be marked with </a:t>
+            </a:r>
+            <a:r>
+              <a:rPr lang="en-US" i="1" dirty="0"/>
+              <a:t>@Named</a:t>
             </a:r>
           </a:p>
           <a:p>
             <a:pPr lvl="1"/>
             <a:r>
               <a:rPr lang="en-US" dirty="0"/>
-              <a:t>Java, </a:t>
+              <a:t>can then use name of the class with first letter in lower case to reference an instance of the bean, </a:t>
             </a:r>
             <a:r>
               <a:rPr lang="en-US" dirty="0" err="1"/>
-              <a:t>NodeJS</a:t>
-            </a:r>
-            <a:r>
-              <a:rPr lang="en-US" dirty="0"/>
-              <a:t>, PHP, etc.</a:t>
-            </a:r>
-          </a:p>
-          <a:p>
-            <a:r>
-              <a:rPr lang="en-US" dirty="0"/>
-              <a:t>Create a whole image of an OS, including all needed software</a:t>
-            </a:r>
-          </a:p>
-          <a:p>
-            <a:pPr lvl="1"/>
-            <a:r>
-              <a:rPr lang="en-US" dirty="0" err="1"/>
-              <a:t>Eg</a:t>
-            </a:r>
-            <a:r>
-              <a:rPr lang="en-US" dirty="0"/>
-              <a:t> the version of JRE/</a:t>
-            </a:r>
-            <a:r>
-              <a:rPr lang="en-US" dirty="0" err="1"/>
-              <a:t>.Net</a:t>
-            </a:r>
-            <a:r>
-              <a:rPr lang="en-US" dirty="0"/>
-              <a:t>/Ruby/etc. that you need</a:t>
-            </a:r>
-          </a:p>
-          <a:p>
-            <a:pPr lvl="1"/>
-            <a:r>
-              <a:rPr lang="en-US" dirty="0" err="1"/>
-              <a:t>Eg</a:t>
-            </a:r>
-            <a:r>
-              <a:rPr lang="en-US" dirty="0"/>
-              <a:t> having a JEE Container like </a:t>
-            </a:r>
-            <a:r>
-              <a:rPr lang="en-US" dirty="0" err="1"/>
-              <a:t>WildFly</a:t>
-            </a:r>
-            <a:endParaRPr lang="en-US" dirty="0"/>
-          </a:p>
-          <a:p>
-            <a:r>
-              <a:rPr lang="en-US" dirty="0"/>
-              <a:t>Particularly useful when developing web applications to install on a server</a:t>
-            </a:r>
-          </a:p>
-          <a:p>
-            <a:r>
-              <a:rPr lang="en-US" dirty="0"/>
-              <a:t>Do not install the OS image on the server, but rather run it in a virtual machine</a:t>
-            </a:r>
-          </a:p>
-          <a:p>
-            <a:r>
-              <a:rPr lang="en-US" dirty="0"/>
-              <a:t>Also, instead of installing a database, could just load a OS image with it</a:t>
-            </a:r>
-          </a:p>
-          <a:p>
-            <a:r>
-              <a:rPr lang="en-US" dirty="0"/>
-              <a:t>How to automate all this?</a:t>
-            </a:r>
-          </a:p>
-          <a:p>
-            <a:endParaRPr lang="en-US" dirty="0"/>
+              <a:t>eg</a:t>
+            </a:r>
+            <a:r>
+              <a:rPr lang="en-US" dirty="0"/>
+              <a:t> a class </a:t>
+            </a:r>
+            <a:r>
+              <a:rPr lang="en-US" i="1" dirty="0" err="1"/>
+              <a:t>FooBar</a:t>
+            </a:r>
+            <a:r>
+              <a:rPr lang="en-US" i="1" dirty="0"/>
+              <a:t> </a:t>
+            </a:r>
+            <a:r>
+              <a:rPr lang="en-US" dirty="0"/>
+              <a:t>can be referenced with a variable called </a:t>
+            </a:r>
+            <a:r>
+              <a:rPr lang="en-US" i="1" dirty="0" err="1"/>
+              <a:t>fooBar</a:t>
+            </a:r>
+            <a:endParaRPr lang="en-US" i="1" dirty="0"/>
+          </a:p>
+          <a:p>
+            <a:r>
+              <a:rPr lang="en-US" dirty="0"/>
+              <a:t>JSF-Beans can have injected EJBs</a:t>
+            </a:r>
+          </a:p>
+          <a:p>
+            <a:r>
+              <a:rPr lang="en-US" dirty="0"/>
+              <a:t>JSF-Beans should not really have business logic (which should be in the EJBs)</a:t>
+            </a:r>
+          </a:p>
+          <a:p>
+            <a:r>
+              <a:rPr lang="en-US" dirty="0"/>
+              <a:t>JSF-Beans should mainly deal with handling of form data and page navigation</a:t>
+            </a:r>
           </a:p>
         </p:txBody>
       </p:sp>
     </p:spTree>
     <p:extLst>
       <p:ext uri="{BB962C8B-B14F-4D97-AF65-F5344CB8AC3E}">
-        <p14:creationId xmlns:p14="http://schemas.microsoft.com/office/powerpoint/2010/main" val="1466880640"/>
+        <p14:creationId xmlns:p14="http://schemas.microsoft.com/office/powerpoint/2010/main" val="4083003587"/>
       </p:ext>
     </p:extLst>
   </p:cSld>
@@ -10414,144 +10518,189 @@
       </p:grpSpPr>
       <p:sp>
         <p:nvSpPr>
-          <p:cNvPr id="2" name="Title 1"/>
+          <p:cNvPr id="2" name="Title 1">
+            <a:extLst>
+              <a:ext uri="{FF2B5EF4-FFF2-40B4-BE49-F238E27FC236}">
+                <a16:creationId xmlns:a16="http://schemas.microsoft.com/office/drawing/2014/main" id="{4E779AA4-DF13-E44D-BBC8-F2C3C12FC2D5}"/>
+              </a:ext>
+            </a:extLst>
+          </p:cNvPr>
           <p:cNvSpPr>
             <a:spLocks noGrp="1"/>
           </p:cNvSpPr>
           <p:nvPr>
             <p:ph type="title"/>
+          </p:nvPr>
+        </p:nvSpPr>
+        <p:spPr/>
+        <p:txBody>
+          <a:bodyPr/>
+          <a:lstStyle/>
+          <a:p>
+            <a:r>
+              <a:rPr lang="en-US" dirty="0"/>
+              <a:t>Page Navigation</a:t>
+            </a:r>
+          </a:p>
+        </p:txBody>
+      </p:sp>
+      <p:sp>
+        <p:nvSpPr>
+          <p:cNvPr id="3" name="Content Placeholder 2">
+            <a:extLst>
+              <a:ext uri="{FF2B5EF4-FFF2-40B4-BE49-F238E27FC236}">
+                <a16:creationId xmlns:a16="http://schemas.microsoft.com/office/drawing/2014/main" id="{F27B7057-46BB-664E-BDCF-BF1815385BCB}"/>
+              </a:ext>
+            </a:extLst>
+          </p:cNvPr>
+          <p:cNvSpPr>
+            <a:spLocks noGrp="1"/>
+          </p:cNvSpPr>
+          <p:nvPr>
+            <p:ph idx="1"/>
           </p:nvPr>
         </p:nvSpPr>
         <p:spPr>
           <a:xfrm>
-            <a:off x="838200" y="365125"/>
-            <a:ext cx="7503826" cy="1325563"/>
+            <a:off x="236220" y="1825624"/>
+            <a:ext cx="11856720" cy="4849496"/>
           </a:xfrm>
         </p:spPr>
         <p:txBody>
-          <a:bodyPr/>
-          <a:lstStyle/>
-          <a:p>
-            <a:r>
-              <a:rPr lang="en-US" dirty="0"/>
-              <a:t>Docker to the Rescue</a:t>
-            </a:r>
-          </a:p>
-        </p:txBody>
-      </p:sp>
-      <p:sp>
-        <p:nvSpPr>
-          <p:cNvPr id="3" name="Content Placeholder 2"/>
-          <p:cNvSpPr>
-            <a:spLocks noGrp="1"/>
-          </p:cNvSpPr>
-          <p:nvPr>
-            <p:ph idx="1"/>
-          </p:nvPr>
-        </p:nvSpPr>
-        <p:spPr>
-          <a:xfrm>
-            <a:off x="284813" y="1825625"/>
-            <a:ext cx="11722308" cy="4351338"/>
-          </a:xfrm>
-        </p:spPr>
-        <p:txBody>
           <a:bodyPr>
-            <a:normAutofit fontScale="85000" lnSpcReduction="20000"/>
+            <a:normAutofit fontScale="92500" lnSpcReduction="10000"/>
           </a:bodyPr>
           <a:lstStyle/>
           <a:p>
             <a:r>
               <a:rPr lang="en-US" dirty="0"/>
-              <a:t>Automate the deployment of application inside software containers</a:t>
-            </a:r>
-          </a:p>
-          <a:p>
-            <a:r>
-              <a:rPr lang="en-US" dirty="0"/>
-              <a:t>Create whole OS images, based on predefined ones</a:t>
-            </a:r>
-          </a:p>
-          <a:p>
+              <a:t>Can simply use </a:t>
+            </a:r>
+            <a:r>
+              <a:rPr lang="en-US" i="1" dirty="0"/>
+              <a:t>&lt;a&gt;</a:t>
+            </a:r>
+            <a:r>
+              <a:rPr lang="en-US" dirty="0"/>
+              <a:t> tags for simple navigation between pages</a:t>
+            </a:r>
+          </a:p>
+          <a:p>
+            <a:r>
+              <a:rPr lang="en-US" dirty="0"/>
+              <a:t>Complexity arises when </a:t>
+            </a:r>
+            <a:r>
+              <a:rPr lang="en-US" i="1" dirty="0"/>
+              <a:t>&lt;form&gt;</a:t>
+            </a:r>
+            <a:r>
+              <a:rPr lang="en-US" dirty="0"/>
+              <a:t> POSTs execute JSF-Bean code on the backend</a:t>
+            </a:r>
+          </a:p>
+          <a:p>
+            <a:pPr lvl="1"/>
+            <a:r>
+              <a:rPr lang="en-US" dirty="0"/>
+              <a:t>this is will be defined inside the “</a:t>
+            </a:r>
+            <a:r>
+              <a:rPr lang="en-US" i="1" dirty="0"/>
+              <a:t>action</a:t>
+            </a:r>
+            <a:r>
+              <a:rPr lang="en-US" dirty="0"/>
+              <a:t>” attribute</a:t>
+            </a:r>
+          </a:p>
+          <a:p>
+            <a:pPr lvl="1"/>
             <a:r>
               <a:rPr lang="en-US" dirty="0" err="1"/>
-              <a:t>Eg</a:t>
-            </a:r>
-            <a:r>
-              <a:rPr lang="en-US" dirty="0"/>
-              <a:t>, a Linux distribution with the latest version of the frameworks you need</a:t>
+              <a:t>eg</a:t>
+            </a:r>
+            <a:r>
+              <a:rPr lang="en-US" dirty="0"/>
+              <a:t>, </a:t>
+            </a:r>
+            <a:r>
+              <a:rPr lang="en-US" i="1" dirty="0"/>
+              <a:t>&lt;</a:t>
+            </a:r>
+            <a:r>
+              <a:rPr lang="en-US" i="1" dirty="0" err="1"/>
+              <a:t>h:commandButton</a:t>
+            </a:r>
+            <a:r>
+              <a:rPr lang="en-US" i="1" dirty="0"/>
+              <a:t> value=“X” action="#{</a:t>
+            </a:r>
+            <a:r>
+              <a:rPr lang="en-US" i="1" dirty="0" err="1"/>
+              <a:t>fooBar.someMethod</a:t>
+            </a:r>
+            <a:r>
+              <a:rPr lang="en-US" i="1" dirty="0"/>
+              <a:t>}" /&gt;</a:t>
+            </a:r>
+          </a:p>
+          <a:p>
+            <a:r>
+              <a:rPr lang="en-US" dirty="0"/>
+              <a:t>If the JSF-Bean method returns void, then the POST returns the rendered HTML of the current page</a:t>
+            </a:r>
+          </a:p>
+          <a:p>
+            <a:r>
+              <a:rPr lang="en-US" dirty="0"/>
+              <a:t>If otherwise returns a String, that can be a URL path toward another page to </a:t>
+            </a:r>
+            <a:r>
+              <a:rPr lang="en-US" i="1" dirty="0"/>
+              <a:t>redirect</a:t>
+            </a:r>
+            <a:r>
+              <a:rPr lang="en-US" dirty="0"/>
+              <a:t> to </a:t>
             </a:r>
           </a:p>
           <a:p>
             <a:pPr lvl="1"/>
             <a:r>
               <a:rPr lang="en-US" dirty="0" err="1"/>
-              <a:t>NodeJS</a:t>
-            </a:r>
-            <a:r>
-              <a:rPr lang="en-US" dirty="0"/>
-              <a:t>, PHP, JDK, etc.</a:t>
-            </a:r>
-          </a:p>
-          <a:p>
-            <a:r>
-              <a:rPr lang="en-US" dirty="0"/>
-              <a:t>Large </a:t>
-            </a:r>
-            <a:r>
-              <a:rPr lang="en-US" i="1" dirty="0"/>
-              <a:t>online</a:t>
-            </a:r>
-            <a:r>
-              <a:rPr lang="en-US" dirty="0"/>
-              <a:t> catalog of existing base images at Docker Hub</a:t>
-            </a:r>
-          </a:p>
-          <a:p>
-            <a:r>
-              <a:rPr lang="en-US" dirty="0"/>
-              <a:t>Your application, and any needed third-party library, will be part of the OS image</a:t>
-            </a:r>
-          </a:p>
-          <a:p>
-            <a:r>
-              <a:rPr lang="en-US" dirty="0"/>
-              <a:t>Use Docker (and tools built on / using it) to deploy your OS images and start them locally or on remote servers</a:t>
-            </a:r>
-          </a:p>
-          <a:p>
-            <a:endParaRPr lang="en-US" dirty="0"/>
-          </a:p>
-        </p:txBody>
-      </p:sp>
-      <p:pic>
-        <p:nvPicPr>
-          <p:cNvPr id="4" name="Picture 3"/>
-          <p:cNvPicPr>
-            <a:picLocks noChangeAspect="1"/>
-          </p:cNvPicPr>
-          <p:nvPr/>
-        </p:nvPicPr>
-        <p:blipFill>
-          <a:blip r:embed="rId2"/>
-          <a:stretch>
-            <a:fillRect/>
-          </a:stretch>
-        </p:blipFill>
-        <p:spPr>
-          <a:xfrm>
-            <a:off x="8330471" y="230188"/>
-            <a:ext cx="3676650" cy="1247775"/>
-          </a:xfrm>
-          <a:prstGeom prst="rect">
-            <a:avLst/>
-          </a:prstGeom>
-        </p:spPr>
-      </p:pic>
+              <a:t>eg</a:t>
+            </a:r>
+            <a:r>
+              <a:rPr lang="en-US" dirty="0"/>
+              <a:t>, once submitted data in a form, want to go to page showing this new data</a:t>
+            </a:r>
+          </a:p>
+          <a:p>
+            <a:pPr lvl="1"/>
+            <a:r>
+              <a:rPr lang="en-US" dirty="0" err="1"/>
+              <a:t>eg</a:t>
+            </a:r>
+            <a:r>
+              <a:rPr lang="en-US" dirty="0"/>
+              <a:t>, after login (</a:t>
+            </a:r>
+            <a:r>
+              <a:rPr lang="en-US" dirty="0" err="1"/>
+              <a:t>userId</a:t>
+            </a:r>
+            <a:r>
+              <a:rPr lang="en-US" dirty="0"/>
+              <a:t>/password sent by a form), automatically go to home-page</a:t>
+            </a:r>
+          </a:p>
+        </p:txBody>
+      </p:sp>
     </p:spTree>
     <p:extLst>
       <p:ext uri="{BB962C8B-B14F-4D97-AF65-F5344CB8AC3E}">
-        <p14:creationId xmlns:p14="http://schemas.microsoft.com/office/powerpoint/2010/main" val="1259258017"/>
+        <p14:creationId xmlns:p14="http://schemas.microsoft.com/office/powerpoint/2010/main" val="2809963023"/>
       </p:ext>
     </p:extLst>
   </p:cSld>
@@ -10580,7 +10729,13 @@
       </p:grpSpPr>
       <p:sp>
         <p:nvSpPr>
-          <p:cNvPr id="2" name="Title 1"/>
+          <p:cNvPr id="2" name="Title 1">
+            <a:extLst>
+              <a:ext uri="{FF2B5EF4-FFF2-40B4-BE49-F238E27FC236}">
+                <a16:creationId xmlns:a16="http://schemas.microsoft.com/office/drawing/2014/main" id="{18E90D6E-1934-9749-BAFD-149E9DAB666E}"/>
+              </a:ext>
+            </a:extLst>
+          </p:cNvPr>
           <p:cNvSpPr>
             <a:spLocks noGrp="1"/>
           </p:cNvSpPr>
@@ -10595,14 +10750,20 @@
           <a:p>
             <a:r>
               <a:rPr lang="en-US" dirty="0"/>
-              <a:t>How to Use Docker?</a:t>
-            </a:r>
-          </a:p>
-        </p:txBody>
-      </p:sp>
-      <p:sp>
-        <p:nvSpPr>
-          <p:cNvPr id="3" name="Content Placeholder 2"/>
+              <a:t>Forward and Redirect</a:t>
+            </a:r>
+          </a:p>
+        </p:txBody>
+      </p:sp>
+      <p:sp>
+        <p:nvSpPr>
+          <p:cNvPr id="3" name="Content Placeholder 2">
+            <a:extLst>
+              <a:ext uri="{FF2B5EF4-FFF2-40B4-BE49-F238E27FC236}">
+                <a16:creationId xmlns:a16="http://schemas.microsoft.com/office/drawing/2014/main" id="{9E3D8622-BA49-254F-A483-EB0A720D6761}"/>
+              </a:ext>
+            </a:extLst>
+          </p:cNvPr>
           <p:cNvSpPr>
             <a:spLocks noGrp="1"/>
           </p:cNvSpPr>
@@ -10612,126 +10773,25 @@
         </p:nvSpPr>
         <p:spPr>
           <a:xfrm>
-            <a:off x="239843" y="1825624"/>
-            <a:ext cx="11789764" cy="4879975"/>
+            <a:off x="281940" y="1825624"/>
+            <a:ext cx="11704320" cy="4879976"/>
           </a:xfrm>
         </p:spPr>
         <p:txBody>
-          <a:bodyPr>
-            <a:normAutofit fontScale="85000" lnSpcReduction="20000"/>
-          </a:bodyPr>
-          <a:lstStyle/>
-          <a:p>
-            <a:r>
-              <a:rPr lang="en-US" dirty="0"/>
-              <a:t>First you need to install it</a:t>
-            </a:r>
-          </a:p>
-          <a:p>
-            <a:pPr lvl="1"/>
-            <a:r>
-              <a:rPr lang="en-US" dirty="0">
-                <a:hlinkClick r:id="rId2"/>
-              </a:rPr>
-              <a:t>https://store.docker.com/</a:t>
-            </a:r>
-            <a:endParaRPr lang="en-US" dirty="0"/>
-          </a:p>
-          <a:p>
-            <a:pPr lvl="1"/>
-            <a:r>
-              <a:rPr lang="en-US" dirty="0"/>
-              <a:t>Note: if you are using Windows, Home Edition might not be enough. You would need a better version, like the Educational one, which you should be able to freely get from school</a:t>
-            </a:r>
-          </a:p>
-          <a:p>
-            <a:r>
-              <a:rPr lang="en-US" dirty="0"/>
-              <a:t>To run existing images, you just need to type commands from a shell terminal (</a:t>
-            </a:r>
-            <a:r>
-              <a:rPr lang="en-US" dirty="0" err="1"/>
-              <a:t>eg</a:t>
-            </a:r>
-            <a:r>
-              <a:rPr lang="en-US" dirty="0"/>
-              <a:t>, </a:t>
-            </a:r>
-            <a:r>
-              <a:rPr lang="en-US" dirty="0" err="1"/>
-              <a:t>GitBash</a:t>
-            </a:r>
-            <a:r>
-              <a:rPr lang="en-US" dirty="0"/>
-              <a:t>)</a:t>
-            </a:r>
-          </a:p>
-          <a:p>
-            <a:r>
-              <a:rPr lang="en-US" dirty="0"/>
-              <a:t>When you are writing your own projects, you need to create configuration files </a:t>
-            </a:r>
-          </a:p>
-          <a:p>
-            <a:pPr lvl="1"/>
-            <a:r>
-              <a:rPr lang="en-US" i="1" dirty="0" err="1"/>
-              <a:t>Dockerfile</a:t>
-            </a:r>
-            <a:r>
-              <a:rPr lang="en-US" dirty="0"/>
-              <a:t>: specify how to build an OS image</a:t>
-            </a:r>
-          </a:p>
-          <a:p>
-            <a:pPr lvl="1"/>
-            <a:r>
-              <a:rPr lang="en-US" i="1" dirty="0" err="1"/>
-              <a:t>docker-compose.yml</a:t>
-            </a:r>
-            <a:r>
-              <a:rPr lang="en-US" dirty="0"/>
-              <a:t>: for handling multi-images</a:t>
-            </a:r>
-          </a:p>
-          <a:p>
-            <a:r>
-              <a:rPr lang="en-US" dirty="0"/>
-              <a:t>Then, use </a:t>
-            </a:r>
-            <a:r>
-              <a:rPr lang="en-US" i="1" dirty="0" err="1"/>
-              <a:t>docker</a:t>
-            </a:r>
-            <a:r>
-              <a:rPr lang="en-US" dirty="0"/>
-              <a:t> and </a:t>
-            </a:r>
-            <a:r>
-              <a:rPr lang="en-US" i="1" dirty="0" err="1"/>
-              <a:t>docker</a:t>
-            </a:r>
-            <a:r>
-              <a:rPr lang="en-US" i="1" dirty="0"/>
-              <a:t>-compose</a:t>
-            </a:r>
-            <a:r>
-              <a:rPr lang="en-US" dirty="0"/>
-              <a:t> commands from the command line</a:t>
-            </a:r>
-          </a:p>
-          <a:p>
-            <a:endParaRPr lang="en-US" dirty="0"/>
-          </a:p>
-          <a:p>
-            <a:endParaRPr lang="en-US" dirty="0"/>
+          <a:bodyPr/>
+          <a:lstStyle/>
+          <a:p>
+            <a:r>
+              <a:rPr lang="en-US" dirty="0"/>
+              <a:t>TODO</a:t>
+            </a:r>
           </a:p>
         </p:txBody>
       </p:sp>
     </p:spTree>
     <p:extLst>
       <p:ext uri="{BB962C8B-B14F-4D97-AF65-F5344CB8AC3E}">
-        <p14:creationId xmlns:p14="http://schemas.microsoft.com/office/powerpoint/2010/main" val="2233846897"/>
+        <p14:creationId xmlns:p14="http://schemas.microsoft.com/office/powerpoint/2010/main" val="3449021113"/>
       </p:ext>
     </p:extLst>
   </p:cSld>
@@ -10849,6 +10909,746 @@
       </p:grpSpPr>
       <p:sp>
         <p:nvSpPr>
+          <p:cNvPr id="4" name="Title 3">
+            <a:extLst>
+              <a:ext uri="{FF2B5EF4-FFF2-40B4-BE49-F238E27FC236}">
+                <a16:creationId xmlns:a16="http://schemas.microsoft.com/office/drawing/2014/main" id="{CD6F25EF-94EE-7449-B93B-F0A83A830C79}"/>
+              </a:ext>
+            </a:extLst>
+          </p:cNvPr>
+          <p:cNvSpPr>
+            <a:spLocks noGrp="1"/>
+          </p:cNvSpPr>
+          <p:nvPr>
+            <p:ph type="title"/>
+          </p:nvPr>
+        </p:nvSpPr>
+        <p:spPr/>
+        <p:txBody>
+          <a:bodyPr/>
+          <a:lstStyle/>
+          <a:p>
+            <a:r>
+              <a:rPr lang="en-US" dirty="0"/>
+              <a:t>Handling Multi-Users</a:t>
+            </a:r>
+          </a:p>
+        </p:txBody>
+      </p:sp>
+      <p:sp>
+        <p:nvSpPr>
+          <p:cNvPr id="5" name="Text Placeholder 4">
+            <a:extLst>
+              <a:ext uri="{FF2B5EF4-FFF2-40B4-BE49-F238E27FC236}">
+                <a16:creationId xmlns:a16="http://schemas.microsoft.com/office/drawing/2014/main" id="{59E9AA0E-0EC5-8E4F-ABBF-588409A91420}"/>
+              </a:ext>
+            </a:extLst>
+          </p:cNvPr>
+          <p:cNvSpPr>
+            <a:spLocks noGrp="1"/>
+          </p:cNvSpPr>
+          <p:nvPr>
+            <p:ph type="body" idx="1"/>
+          </p:nvPr>
+        </p:nvSpPr>
+        <p:spPr/>
+        <p:txBody>
+          <a:bodyPr/>
+          <a:lstStyle/>
+          <a:p>
+            <a:endParaRPr lang="en-US"/>
+          </a:p>
+        </p:txBody>
+      </p:sp>
+    </p:spTree>
+    <p:extLst>
+      <p:ext uri="{BB962C8B-B14F-4D97-AF65-F5344CB8AC3E}">
+        <p14:creationId xmlns:p14="http://schemas.microsoft.com/office/powerpoint/2010/main" val="1921544514"/>
+      </p:ext>
+    </p:extLst>
+  </p:cSld>
+  <p:clrMapOvr>
+    <a:masterClrMapping/>
+  </p:clrMapOvr>
+</p:sld>
+</file>
+
+<file path=ppt/slides/slide51.xml><?xml version="1.0" encoding="utf-8"?>
+<p:sld xmlns:a="http://schemas.openxmlformats.org/drawingml/2006/main" xmlns:r="http://schemas.openxmlformats.org/officeDocument/2006/relationships" xmlns:p="http://schemas.openxmlformats.org/presentationml/2006/main">
+  <p:cSld>
+    <p:spTree>
+      <p:nvGrpSpPr>
+        <p:cNvPr id="1" name=""/>
+        <p:cNvGrpSpPr/>
+        <p:nvPr/>
+      </p:nvGrpSpPr>
+      <p:grpSpPr>
+        <a:xfrm>
+          <a:off x="0" y="0"/>
+          <a:ext cx="0" cy="0"/>
+          <a:chOff x="0" y="0"/>
+          <a:chExt cx="0" cy="0"/>
+        </a:xfrm>
+      </p:grpSpPr>
+      <p:sp>
+        <p:nvSpPr>
+          <p:cNvPr id="2" name="Title 1">
+            <a:extLst>
+              <a:ext uri="{FF2B5EF4-FFF2-40B4-BE49-F238E27FC236}">
+                <a16:creationId xmlns:a16="http://schemas.microsoft.com/office/drawing/2014/main" id="{B5EB1F9E-A513-4346-BE81-83979C92C6A8}"/>
+              </a:ext>
+            </a:extLst>
+          </p:cNvPr>
+          <p:cNvSpPr>
+            <a:spLocks noGrp="1"/>
+          </p:cNvSpPr>
+          <p:nvPr>
+            <p:ph type="title"/>
+          </p:nvPr>
+        </p:nvSpPr>
+        <p:spPr/>
+        <p:txBody>
+          <a:bodyPr/>
+          <a:lstStyle/>
+          <a:p>
+            <a:endParaRPr lang="en-US"/>
+          </a:p>
+        </p:txBody>
+      </p:sp>
+      <p:sp>
+        <p:nvSpPr>
+          <p:cNvPr id="3" name="Content Placeholder 2">
+            <a:extLst>
+              <a:ext uri="{FF2B5EF4-FFF2-40B4-BE49-F238E27FC236}">
+                <a16:creationId xmlns:a16="http://schemas.microsoft.com/office/drawing/2014/main" id="{41DD1CCD-47F8-DA42-B609-62850DFC4701}"/>
+              </a:ext>
+            </a:extLst>
+          </p:cNvPr>
+          <p:cNvSpPr>
+            <a:spLocks noGrp="1"/>
+          </p:cNvSpPr>
+          <p:nvPr>
+            <p:ph idx="1"/>
+          </p:nvPr>
+        </p:nvSpPr>
+        <p:spPr/>
+        <p:txBody>
+          <a:bodyPr/>
+          <a:lstStyle/>
+          <a:p>
+            <a:r>
+              <a:rPr lang="en-US" dirty="0"/>
+              <a:t>TODO</a:t>
+            </a:r>
+          </a:p>
+        </p:txBody>
+      </p:sp>
+    </p:spTree>
+    <p:extLst>
+      <p:ext uri="{BB962C8B-B14F-4D97-AF65-F5344CB8AC3E}">
+        <p14:creationId xmlns:p14="http://schemas.microsoft.com/office/powerpoint/2010/main" val="3431773831"/>
+      </p:ext>
+    </p:extLst>
+  </p:cSld>
+  <p:clrMapOvr>
+    <a:masterClrMapping/>
+  </p:clrMapOvr>
+</p:sld>
+</file>
+
+<file path=ppt/slides/slide52.xml><?xml version="1.0" encoding="utf-8"?>
+<p:sld xmlns:a="http://schemas.openxmlformats.org/drawingml/2006/main" xmlns:r="http://schemas.openxmlformats.org/officeDocument/2006/relationships" xmlns:p="http://schemas.openxmlformats.org/presentationml/2006/main">
+  <p:cSld>
+    <p:spTree>
+      <p:nvGrpSpPr>
+        <p:cNvPr id="1" name=""/>
+        <p:cNvGrpSpPr/>
+        <p:nvPr/>
+      </p:nvGrpSpPr>
+      <p:grpSpPr>
+        <a:xfrm>
+          <a:off x="0" y="0"/>
+          <a:ext cx="0" cy="0"/>
+          <a:chOff x="0" y="0"/>
+          <a:chExt cx="0" cy="0"/>
+        </a:xfrm>
+      </p:grpSpPr>
+      <p:sp>
+        <p:nvSpPr>
+          <p:cNvPr id="2" name="Title 1"/>
+          <p:cNvSpPr>
+            <a:spLocks noGrp="1"/>
+          </p:cNvSpPr>
+          <p:nvPr>
+            <p:ph type="title"/>
+          </p:nvPr>
+        </p:nvSpPr>
+        <p:spPr>
+          <a:xfrm>
+            <a:off x="838200" y="3002307"/>
+            <a:ext cx="10515600" cy="1325563"/>
+          </a:xfrm>
+        </p:spPr>
+        <p:txBody>
+          <a:bodyPr/>
+          <a:lstStyle/>
+          <a:p>
+            <a:r>
+              <a:rPr lang="en-US" dirty="0"/>
+              <a:t>Docker</a:t>
+            </a:r>
+          </a:p>
+        </p:txBody>
+      </p:sp>
+    </p:spTree>
+    <p:extLst>
+      <p:ext uri="{BB962C8B-B14F-4D97-AF65-F5344CB8AC3E}">
+        <p14:creationId xmlns:p14="http://schemas.microsoft.com/office/powerpoint/2010/main" val="3402842063"/>
+      </p:ext>
+    </p:extLst>
+  </p:cSld>
+  <p:clrMapOvr>
+    <a:masterClrMapping/>
+  </p:clrMapOvr>
+</p:sld>
+</file>
+
+<file path=ppt/slides/slide53.xml><?xml version="1.0" encoding="utf-8"?>
+<p:sld xmlns:a="http://schemas.openxmlformats.org/drawingml/2006/main" xmlns:r="http://schemas.openxmlformats.org/officeDocument/2006/relationships" xmlns:p="http://schemas.openxmlformats.org/presentationml/2006/main">
+  <p:cSld>
+    <p:spTree>
+      <p:nvGrpSpPr>
+        <p:cNvPr id="1" name=""/>
+        <p:cNvGrpSpPr/>
+        <p:nvPr/>
+      </p:nvGrpSpPr>
+      <p:grpSpPr>
+        <a:xfrm>
+          <a:off x="0" y="0"/>
+          <a:ext cx="0" cy="0"/>
+          <a:chOff x="0" y="0"/>
+          <a:chExt cx="0" cy="0"/>
+        </a:xfrm>
+      </p:grpSpPr>
+      <p:sp>
+        <p:nvSpPr>
+          <p:cNvPr id="2" name="Title 1"/>
+          <p:cNvSpPr>
+            <a:spLocks noGrp="1"/>
+          </p:cNvSpPr>
+          <p:nvPr>
+            <p:ph type="title"/>
+          </p:nvPr>
+        </p:nvSpPr>
+        <p:spPr>
+          <a:xfrm>
+            <a:off x="314793" y="365125"/>
+            <a:ext cx="11489961" cy="1325563"/>
+          </a:xfrm>
+        </p:spPr>
+        <p:txBody>
+          <a:bodyPr>
+            <a:normAutofit/>
+          </a:bodyPr>
+          <a:lstStyle/>
+          <a:p>
+            <a:r>
+              <a:rPr lang="en-US" dirty="0"/>
+              <a:t>Deploy OS Images </a:t>
+            </a:r>
+          </a:p>
+        </p:txBody>
+      </p:sp>
+      <p:sp>
+        <p:nvSpPr>
+          <p:cNvPr id="3" name="Content Placeholder 2"/>
+          <p:cNvSpPr>
+            <a:spLocks noGrp="1"/>
+          </p:cNvSpPr>
+          <p:nvPr>
+            <p:ph idx="1"/>
+          </p:nvPr>
+        </p:nvSpPr>
+        <p:spPr>
+          <a:xfrm>
+            <a:off x="314793" y="1825624"/>
+            <a:ext cx="11699823" cy="4882473"/>
+          </a:xfrm>
+        </p:spPr>
+        <p:txBody>
+          <a:bodyPr>
+            <a:normAutofit fontScale="85000" lnSpcReduction="10000"/>
+          </a:bodyPr>
+          <a:lstStyle/>
+          <a:p>
+            <a:r>
+              <a:rPr lang="en-US" dirty="0"/>
+              <a:t>When developing applications, not limit to just package your code </a:t>
+            </a:r>
+          </a:p>
+          <a:p>
+            <a:pPr lvl="1"/>
+            <a:r>
+              <a:rPr lang="en-US" dirty="0"/>
+              <a:t>Java, </a:t>
+            </a:r>
+            <a:r>
+              <a:rPr lang="en-US" dirty="0" err="1"/>
+              <a:t>NodeJS</a:t>
+            </a:r>
+            <a:r>
+              <a:rPr lang="en-US" dirty="0"/>
+              <a:t>, PHP, etc.</a:t>
+            </a:r>
+          </a:p>
+          <a:p>
+            <a:r>
+              <a:rPr lang="en-US" dirty="0"/>
+              <a:t>Create a whole image of an OS, including all needed software</a:t>
+            </a:r>
+          </a:p>
+          <a:p>
+            <a:pPr lvl="1"/>
+            <a:r>
+              <a:rPr lang="en-US" dirty="0" err="1"/>
+              <a:t>Eg</a:t>
+            </a:r>
+            <a:r>
+              <a:rPr lang="en-US" dirty="0"/>
+              <a:t> the version of JRE/</a:t>
+            </a:r>
+            <a:r>
+              <a:rPr lang="en-US" dirty="0" err="1"/>
+              <a:t>.Net</a:t>
+            </a:r>
+            <a:r>
+              <a:rPr lang="en-US" dirty="0"/>
+              <a:t>/Ruby/etc. that you need</a:t>
+            </a:r>
+          </a:p>
+          <a:p>
+            <a:pPr lvl="1"/>
+            <a:r>
+              <a:rPr lang="en-US" dirty="0" err="1"/>
+              <a:t>Eg</a:t>
+            </a:r>
+            <a:r>
+              <a:rPr lang="en-US" dirty="0"/>
+              <a:t> having a JEE Container like </a:t>
+            </a:r>
+            <a:r>
+              <a:rPr lang="en-US" dirty="0" err="1"/>
+              <a:t>WildFly</a:t>
+            </a:r>
+            <a:endParaRPr lang="en-US" dirty="0"/>
+          </a:p>
+          <a:p>
+            <a:r>
+              <a:rPr lang="en-US" dirty="0"/>
+              <a:t>Particularly useful when developing web applications to install on a server</a:t>
+            </a:r>
+          </a:p>
+          <a:p>
+            <a:r>
+              <a:rPr lang="en-US" dirty="0"/>
+              <a:t>Do not install the OS image on the server, but rather run it in a virtual machine</a:t>
+            </a:r>
+          </a:p>
+          <a:p>
+            <a:r>
+              <a:rPr lang="en-US" dirty="0"/>
+              <a:t>Also, instead of installing a database, could just load a OS image with it</a:t>
+            </a:r>
+          </a:p>
+          <a:p>
+            <a:r>
+              <a:rPr lang="en-US" dirty="0"/>
+              <a:t>How to automate all this?</a:t>
+            </a:r>
+          </a:p>
+          <a:p>
+            <a:endParaRPr lang="en-US" dirty="0"/>
+          </a:p>
+        </p:txBody>
+      </p:sp>
+    </p:spTree>
+    <p:extLst>
+      <p:ext uri="{BB962C8B-B14F-4D97-AF65-F5344CB8AC3E}">
+        <p14:creationId xmlns:p14="http://schemas.microsoft.com/office/powerpoint/2010/main" val="1466880640"/>
+      </p:ext>
+    </p:extLst>
+  </p:cSld>
+  <p:clrMapOvr>
+    <a:masterClrMapping/>
+  </p:clrMapOvr>
+</p:sld>
+</file>
+
+<file path=ppt/slides/slide54.xml><?xml version="1.0" encoding="utf-8"?>
+<p:sld xmlns:a="http://schemas.openxmlformats.org/drawingml/2006/main" xmlns:r="http://schemas.openxmlformats.org/officeDocument/2006/relationships" xmlns:p="http://schemas.openxmlformats.org/presentationml/2006/main">
+  <p:cSld>
+    <p:spTree>
+      <p:nvGrpSpPr>
+        <p:cNvPr id="1" name=""/>
+        <p:cNvGrpSpPr/>
+        <p:nvPr/>
+      </p:nvGrpSpPr>
+      <p:grpSpPr>
+        <a:xfrm>
+          <a:off x="0" y="0"/>
+          <a:ext cx="0" cy="0"/>
+          <a:chOff x="0" y="0"/>
+          <a:chExt cx="0" cy="0"/>
+        </a:xfrm>
+      </p:grpSpPr>
+      <p:sp>
+        <p:nvSpPr>
+          <p:cNvPr id="2" name="Title 1"/>
+          <p:cNvSpPr>
+            <a:spLocks noGrp="1"/>
+          </p:cNvSpPr>
+          <p:nvPr>
+            <p:ph type="title"/>
+          </p:nvPr>
+        </p:nvSpPr>
+        <p:spPr>
+          <a:xfrm>
+            <a:off x="838200" y="365125"/>
+            <a:ext cx="7503826" cy="1325563"/>
+          </a:xfrm>
+        </p:spPr>
+        <p:txBody>
+          <a:bodyPr/>
+          <a:lstStyle/>
+          <a:p>
+            <a:r>
+              <a:rPr lang="en-US" dirty="0"/>
+              <a:t>Docker to the Rescue</a:t>
+            </a:r>
+          </a:p>
+        </p:txBody>
+      </p:sp>
+      <p:sp>
+        <p:nvSpPr>
+          <p:cNvPr id="3" name="Content Placeholder 2"/>
+          <p:cNvSpPr>
+            <a:spLocks noGrp="1"/>
+          </p:cNvSpPr>
+          <p:nvPr>
+            <p:ph idx="1"/>
+          </p:nvPr>
+        </p:nvSpPr>
+        <p:spPr>
+          <a:xfrm>
+            <a:off x="284813" y="1825625"/>
+            <a:ext cx="11722308" cy="4351338"/>
+          </a:xfrm>
+        </p:spPr>
+        <p:txBody>
+          <a:bodyPr>
+            <a:normAutofit fontScale="85000" lnSpcReduction="20000"/>
+          </a:bodyPr>
+          <a:lstStyle/>
+          <a:p>
+            <a:r>
+              <a:rPr lang="en-US" dirty="0"/>
+              <a:t>Automate the deployment of application inside software containers</a:t>
+            </a:r>
+          </a:p>
+          <a:p>
+            <a:r>
+              <a:rPr lang="en-US" dirty="0"/>
+              <a:t>Create whole OS images, based on predefined ones</a:t>
+            </a:r>
+          </a:p>
+          <a:p>
+            <a:r>
+              <a:rPr lang="en-US" dirty="0" err="1"/>
+              <a:t>Eg</a:t>
+            </a:r>
+            <a:r>
+              <a:rPr lang="en-US" dirty="0"/>
+              <a:t>, a Linux distribution with the latest version of the frameworks you need</a:t>
+            </a:r>
+          </a:p>
+          <a:p>
+            <a:pPr lvl="1"/>
+            <a:r>
+              <a:rPr lang="en-US" dirty="0" err="1"/>
+              <a:t>NodeJS</a:t>
+            </a:r>
+            <a:r>
+              <a:rPr lang="en-US" dirty="0"/>
+              <a:t>, PHP, JDK, etc.</a:t>
+            </a:r>
+          </a:p>
+          <a:p>
+            <a:r>
+              <a:rPr lang="en-US" dirty="0"/>
+              <a:t>Large </a:t>
+            </a:r>
+            <a:r>
+              <a:rPr lang="en-US" i="1" dirty="0"/>
+              <a:t>online</a:t>
+            </a:r>
+            <a:r>
+              <a:rPr lang="en-US" dirty="0"/>
+              <a:t> catalog of existing base images at Docker Hub</a:t>
+            </a:r>
+          </a:p>
+          <a:p>
+            <a:r>
+              <a:rPr lang="en-US" dirty="0"/>
+              <a:t>Your application, and any needed third-party library, will be part of the OS image</a:t>
+            </a:r>
+          </a:p>
+          <a:p>
+            <a:r>
+              <a:rPr lang="en-US" dirty="0"/>
+              <a:t>Use Docker (and tools built on / using it) to deploy your OS images and start them locally or on remote servers</a:t>
+            </a:r>
+          </a:p>
+          <a:p>
+            <a:endParaRPr lang="en-US" dirty="0"/>
+          </a:p>
+        </p:txBody>
+      </p:sp>
+      <p:pic>
+        <p:nvPicPr>
+          <p:cNvPr id="4" name="Picture 3"/>
+          <p:cNvPicPr>
+            <a:picLocks noChangeAspect="1"/>
+          </p:cNvPicPr>
+          <p:nvPr/>
+        </p:nvPicPr>
+        <p:blipFill>
+          <a:blip r:embed="rId2"/>
+          <a:stretch>
+            <a:fillRect/>
+          </a:stretch>
+        </p:blipFill>
+        <p:spPr>
+          <a:xfrm>
+            <a:off x="8330471" y="230188"/>
+            <a:ext cx="3676650" cy="1247775"/>
+          </a:xfrm>
+          <a:prstGeom prst="rect">
+            <a:avLst/>
+          </a:prstGeom>
+        </p:spPr>
+      </p:pic>
+    </p:spTree>
+    <p:extLst>
+      <p:ext uri="{BB962C8B-B14F-4D97-AF65-F5344CB8AC3E}">
+        <p14:creationId xmlns:p14="http://schemas.microsoft.com/office/powerpoint/2010/main" val="1259258017"/>
+      </p:ext>
+    </p:extLst>
+  </p:cSld>
+  <p:clrMapOvr>
+    <a:masterClrMapping/>
+  </p:clrMapOvr>
+</p:sld>
+</file>
+
+<file path=ppt/slides/slide55.xml><?xml version="1.0" encoding="utf-8"?>
+<p:sld xmlns:a="http://schemas.openxmlformats.org/drawingml/2006/main" xmlns:r="http://schemas.openxmlformats.org/officeDocument/2006/relationships" xmlns:p="http://schemas.openxmlformats.org/presentationml/2006/main">
+  <p:cSld>
+    <p:spTree>
+      <p:nvGrpSpPr>
+        <p:cNvPr id="1" name=""/>
+        <p:cNvGrpSpPr/>
+        <p:nvPr/>
+      </p:nvGrpSpPr>
+      <p:grpSpPr>
+        <a:xfrm>
+          <a:off x="0" y="0"/>
+          <a:ext cx="0" cy="0"/>
+          <a:chOff x="0" y="0"/>
+          <a:chExt cx="0" cy="0"/>
+        </a:xfrm>
+      </p:grpSpPr>
+      <p:sp>
+        <p:nvSpPr>
+          <p:cNvPr id="2" name="Title 1"/>
+          <p:cNvSpPr>
+            <a:spLocks noGrp="1"/>
+          </p:cNvSpPr>
+          <p:nvPr>
+            <p:ph type="title"/>
+          </p:nvPr>
+        </p:nvSpPr>
+        <p:spPr/>
+        <p:txBody>
+          <a:bodyPr/>
+          <a:lstStyle/>
+          <a:p>
+            <a:r>
+              <a:rPr lang="en-US" dirty="0"/>
+              <a:t>How to Use Docker?</a:t>
+            </a:r>
+          </a:p>
+        </p:txBody>
+      </p:sp>
+      <p:sp>
+        <p:nvSpPr>
+          <p:cNvPr id="3" name="Content Placeholder 2"/>
+          <p:cNvSpPr>
+            <a:spLocks noGrp="1"/>
+          </p:cNvSpPr>
+          <p:nvPr>
+            <p:ph idx="1"/>
+          </p:nvPr>
+        </p:nvSpPr>
+        <p:spPr>
+          <a:xfrm>
+            <a:off x="239843" y="1825624"/>
+            <a:ext cx="11789764" cy="4879975"/>
+          </a:xfrm>
+        </p:spPr>
+        <p:txBody>
+          <a:bodyPr>
+            <a:normAutofit fontScale="85000" lnSpcReduction="20000"/>
+          </a:bodyPr>
+          <a:lstStyle/>
+          <a:p>
+            <a:r>
+              <a:rPr lang="en-US" dirty="0"/>
+              <a:t>First you need to install it</a:t>
+            </a:r>
+          </a:p>
+          <a:p>
+            <a:pPr lvl="1"/>
+            <a:r>
+              <a:rPr lang="en-US" dirty="0">
+                <a:hlinkClick r:id="rId2"/>
+              </a:rPr>
+              <a:t>https://store.docker.com/</a:t>
+            </a:r>
+            <a:endParaRPr lang="en-US" dirty="0"/>
+          </a:p>
+          <a:p>
+            <a:pPr lvl="1"/>
+            <a:r>
+              <a:rPr lang="en-US" dirty="0"/>
+              <a:t>Note: if you are using Windows, Home Edition might not be enough. You would need a better version, like the Educational one, which you should be able to freely get from school</a:t>
+            </a:r>
+          </a:p>
+          <a:p>
+            <a:r>
+              <a:rPr lang="en-US" dirty="0"/>
+              <a:t>To run existing images, you just need to type commands from a shell terminal (</a:t>
+            </a:r>
+            <a:r>
+              <a:rPr lang="en-US" dirty="0" err="1"/>
+              <a:t>eg</a:t>
+            </a:r>
+            <a:r>
+              <a:rPr lang="en-US" dirty="0"/>
+              <a:t>, </a:t>
+            </a:r>
+            <a:r>
+              <a:rPr lang="en-US" dirty="0" err="1"/>
+              <a:t>GitBash</a:t>
+            </a:r>
+            <a:r>
+              <a:rPr lang="en-US" dirty="0"/>
+              <a:t>)</a:t>
+            </a:r>
+          </a:p>
+          <a:p>
+            <a:r>
+              <a:rPr lang="en-US" dirty="0"/>
+              <a:t>When you are writing your own projects, you need to create configuration files </a:t>
+            </a:r>
+          </a:p>
+          <a:p>
+            <a:pPr lvl="1"/>
+            <a:r>
+              <a:rPr lang="en-US" i="1" dirty="0" err="1"/>
+              <a:t>Dockerfile</a:t>
+            </a:r>
+            <a:r>
+              <a:rPr lang="en-US" dirty="0"/>
+              <a:t>: specify how to build an OS image</a:t>
+            </a:r>
+          </a:p>
+          <a:p>
+            <a:pPr lvl="1"/>
+            <a:r>
+              <a:rPr lang="en-US" i="1" dirty="0" err="1"/>
+              <a:t>docker-compose.yml</a:t>
+            </a:r>
+            <a:r>
+              <a:rPr lang="en-US" dirty="0"/>
+              <a:t>: for handling multi-images</a:t>
+            </a:r>
+          </a:p>
+          <a:p>
+            <a:r>
+              <a:rPr lang="en-US" dirty="0"/>
+              <a:t>Then, use </a:t>
+            </a:r>
+            <a:r>
+              <a:rPr lang="en-US" i="1" dirty="0" err="1"/>
+              <a:t>docker</a:t>
+            </a:r>
+            <a:r>
+              <a:rPr lang="en-US" dirty="0"/>
+              <a:t> and </a:t>
+            </a:r>
+            <a:r>
+              <a:rPr lang="en-US" i="1" dirty="0" err="1"/>
+              <a:t>docker</a:t>
+            </a:r>
+            <a:r>
+              <a:rPr lang="en-US" i="1" dirty="0"/>
+              <a:t>-compose</a:t>
+            </a:r>
+            <a:r>
+              <a:rPr lang="en-US" dirty="0"/>
+              <a:t> commands from the command line</a:t>
+            </a:r>
+          </a:p>
+          <a:p>
+            <a:endParaRPr lang="en-US" dirty="0"/>
+          </a:p>
+          <a:p>
+            <a:endParaRPr lang="en-US" dirty="0"/>
+          </a:p>
+        </p:txBody>
+      </p:sp>
+    </p:spTree>
+    <p:extLst>
+      <p:ext uri="{BB962C8B-B14F-4D97-AF65-F5344CB8AC3E}">
+        <p14:creationId xmlns:p14="http://schemas.microsoft.com/office/powerpoint/2010/main" val="2233846897"/>
+      </p:ext>
+    </p:extLst>
+  </p:cSld>
+  <p:clrMapOvr>
+    <a:masterClrMapping/>
+  </p:clrMapOvr>
+</p:sld>
+</file>
+
+<file path=ppt/slides/slide56.xml><?xml version="1.0" encoding="utf-8"?>
+<p:sld xmlns:a="http://schemas.openxmlformats.org/drawingml/2006/main" xmlns:r="http://schemas.openxmlformats.org/officeDocument/2006/relationships" xmlns:p="http://schemas.openxmlformats.org/presentationml/2006/main">
+  <p:cSld>
+    <p:spTree>
+      <p:nvGrpSpPr>
+        <p:cNvPr id="1" name=""/>
+        <p:cNvGrpSpPr/>
+        <p:nvPr/>
+      </p:nvGrpSpPr>
+      <p:grpSpPr>
+        <a:xfrm>
+          <a:off x="0" y="0"/>
+          <a:ext cx="0" cy="0"/>
+          <a:chOff x="0" y="0"/>
+          <a:chExt cx="0" cy="0"/>
+        </a:xfrm>
+      </p:grpSpPr>
+      <p:sp>
+        <p:nvSpPr>
           <p:cNvPr id="2" name="Title 1"/>
           <p:cNvSpPr>
             <a:spLocks noGrp="1"/>
@@ -11012,7 +11812,7 @@
 </p:sld>
 </file>
 
-<file path=ppt/slides/slide51.xml><?xml version="1.0" encoding="utf-8"?>
+<file path=ppt/slides/slide57.xml><?xml version="1.0" encoding="utf-8"?>
 <p:sld xmlns:a="http://schemas.openxmlformats.org/drawingml/2006/main" xmlns:r="http://schemas.openxmlformats.org/officeDocument/2006/relationships" xmlns:p="http://schemas.openxmlformats.org/presentationml/2006/main">
   <p:cSld>
     <p:spTree>
@@ -11072,7 +11872,7 @@
 </p:sld>
 </file>
 
-<file path=ppt/slides/slide52.xml><?xml version="1.0" encoding="utf-8"?>
+<file path=ppt/slides/slide58.xml><?xml version="1.0" encoding="utf-8"?>
 <p:sld xmlns:a="http://schemas.openxmlformats.org/drawingml/2006/main" xmlns:r="http://schemas.openxmlformats.org/officeDocument/2006/relationships" xmlns:p="http://schemas.openxmlformats.org/presentationml/2006/main">
   <p:cSld>
     <p:spTree>
@@ -11282,7 +12082,7 @@
 </p:sld>
 </file>
 
-<file path=ppt/slides/slide53.xml><?xml version="1.0" encoding="utf-8"?>
+<file path=ppt/slides/slide59.xml><?xml version="1.0" encoding="utf-8"?>
 <p:sld xmlns:a="http://schemas.openxmlformats.org/drawingml/2006/main" xmlns:r="http://schemas.openxmlformats.org/officeDocument/2006/relationships" xmlns:p="http://schemas.openxmlformats.org/presentationml/2006/main">
   <p:cSld>
     <p:spTree>
@@ -11342,801 +12142,6 @@
 </p:sld>
 </file>
 
-<file path=ppt/slides/slide54.xml><?xml version="1.0" encoding="utf-8"?>
-<p:sld xmlns:a="http://schemas.openxmlformats.org/drawingml/2006/main" xmlns:r="http://schemas.openxmlformats.org/officeDocument/2006/relationships" xmlns:p="http://schemas.openxmlformats.org/presentationml/2006/main">
-  <p:cSld>
-    <p:spTree>
-      <p:nvGrpSpPr>
-        <p:cNvPr id="1" name=""/>
-        <p:cNvGrpSpPr/>
-        <p:nvPr/>
-      </p:nvGrpSpPr>
-      <p:grpSpPr>
-        <a:xfrm>
-          <a:off x="0" y="0"/>
-          <a:ext cx="0" cy="0"/>
-          <a:chOff x="0" y="0"/>
-          <a:chExt cx="0" cy="0"/>
-        </a:xfrm>
-      </p:grpSpPr>
-      <p:sp>
-        <p:nvSpPr>
-          <p:cNvPr id="2" name="Title 1"/>
-          <p:cNvSpPr>
-            <a:spLocks noGrp="1"/>
-          </p:cNvSpPr>
-          <p:nvPr>
-            <p:ph type="title"/>
-          </p:nvPr>
-        </p:nvSpPr>
-        <p:spPr/>
-        <p:txBody>
-          <a:bodyPr/>
-          <a:lstStyle/>
-          <a:p>
-            <a:r>
-              <a:rPr lang="en-US" dirty="0"/>
-              <a:t>Docker Commands</a:t>
-            </a:r>
-          </a:p>
-        </p:txBody>
-      </p:sp>
-      <p:sp>
-        <p:nvSpPr>
-          <p:cNvPr id="3" name="Content Placeholder 2"/>
-          <p:cNvSpPr>
-            <a:spLocks noGrp="1"/>
-          </p:cNvSpPr>
-          <p:nvPr>
-            <p:ph idx="1"/>
-          </p:nvPr>
-        </p:nvSpPr>
-        <p:spPr>
-          <a:xfrm>
-            <a:off x="265043" y="1825625"/>
-            <a:ext cx="11794435" cy="4932984"/>
-          </a:xfrm>
-        </p:spPr>
-        <p:txBody>
-          <a:bodyPr>
-            <a:normAutofit fontScale="92500"/>
-          </a:bodyPr>
-          <a:lstStyle/>
-          <a:p>
-            <a:r>
-              <a:rPr lang="en-US" b="1" i="1" dirty="0" err="1"/>
-              <a:t>docker</a:t>
-            </a:r>
-            <a:r>
-              <a:rPr lang="en-US" b="1" i="1" dirty="0"/>
-              <a:t> build -t &lt;name&gt; .</a:t>
-            </a:r>
-          </a:p>
-          <a:p>
-            <a:pPr lvl="1"/>
-            <a:r>
-              <a:rPr lang="en-US" dirty="0"/>
-              <a:t>Create an image with name &lt;</a:t>
-            </a:r>
-            <a:r>
-              <a:rPr lang="en-US" i="1" dirty="0"/>
-              <a:t>name</a:t>
-            </a:r>
-            <a:r>
-              <a:rPr lang="en-US" dirty="0"/>
-              <a:t>&gt;, from the </a:t>
-            </a:r>
-            <a:r>
-              <a:rPr lang="en-US" i="1" dirty="0" err="1"/>
-              <a:t>Dockerfile</a:t>
-            </a:r>
-            <a:r>
-              <a:rPr lang="en-US" dirty="0"/>
-              <a:t> in the current “.” folder</a:t>
-            </a:r>
-          </a:p>
-          <a:p>
-            <a:r>
-              <a:rPr lang="en-US" b="1" i="1" dirty="0" err="1"/>
-              <a:t>docker</a:t>
-            </a:r>
-            <a:r>
-              <a:rPr lang="en-US" b="1" i="1" dirty="0"/>
-              <a:t> run &lt;name&gt;</a:t>
-            </a:r>
-          </a:p>
-          <a:p>
-            <a:pPr lvl="1"/>
-            <a:r>
-              <a:rPr lang="en-US" dirty="0"/>
-              <a:t>Run the given image</a:t>
-            </a:r>
-          </a:p>
-          <a:p>
-            <a:r>
-              <a:rPr lang="en-US" b="1" dirty="0" err="1"/>
-              <a:t>docker</a:t>
-            </a:r>
-            <a:r>
-              <a:rPr lang="en-US" b="1" dirty="0"/>
-              <a:t> </a:t>
-            </a:r>
-            <a:r>
-              <a:rPr lang="en-US" b="1" dirty="0" err="1"/>
-              <a:t>ps</a:t>
-            </a:r>
-            <a:endParaRPr lang="en-US" b="1" dirty="0"/>
-          </a:p>
-          <a:p>
-            <a:pPr lvl="1"/>
-            <a:r>
-              <a:rPr lang="en-US" dirty="0"/>
-              <a:t>Show running images</a:t>
-            </a:r>
-          </a:p>
-          <a:p>
-            <a:r>
-              <a:rPr lang="en-US" b="1" dirty="0" err="1"/>
-              <a:t>docker</a:t>
-            </a:r>
-            <a:r>
-              <a:rPr lang="en-US" b="1" dirty="0"/>
-              <a:t> stop &lt;id&gt;</a:t>
-            </a:r>
-          </a:p>
-          <a:p>
-            <a:pPr lvl="1"/>
-            <a:r>
-              <a:rPr lang="en-US" dirty="0"/>
-              <a:t>Stop the given running image. Note: an image can be run in several instances, with different ids</a:t>
-            </a:r>
-          </a:p>
-          <a:p>
-            <a:r>
-              <a:rPr lang="en-US" dirty="0"/>
-              <a:t>In IntelliJ, you can also install “</a:t>
-            </a:r>
-            <a:r>
-              <a:rPr lang="en-US" i="1" dirty="0"/>
-              <a:t>Docker integration</a:t>
-            </a:r>
-            <a:r>
-              <a:rPr lang="en-US" dirty="0"/>
-              <a:t>” plugin</a:t>
-            </a:r>
-          </a:p>
-          <a:p>
-            <a:endParaRPr lang="en-US" dirty="0"/>
-          </a:p>
-        </p:txBody>
-      </p:sp>
-    </p:spTree>
-    <p:extLst>
-      <p:ext uri="{BB962C8B-B14F-4D97-AF65-F5344CB8AC3E}">
-        <p14:creationId xmlns:p14="http://schemas.microsoft.com/office/powerpoint/2010/main" val="3257655982"/>
-      </p:ext>
-    </p:extLst>
-  </p:cSld>
-  <p:clrMapOvr>
-    <a:masterClrMapping/>
-  </p:clrMapOvr>
-</p:sld>
-</file>
-
-<file path=ppt/slides/slide55.xml><?xml version="1.0" encoding="utf-8"?>
-<p:sld xmlns:a="http://schemas.openxmlformats.org/drawingml/2006/main" xmlns:r="http://schemas.openxmlformats.org/officeDocument/2006/relationships" xmlns:p="http://schemas.openxmlformats.org/presentationml/2006/main">
-  <p:cSld>
-    <p:spTree>
-      <p:nvGrpSpPr>
-        <p:cNvPr id="1" name=""/>
-        <p:cNvGrpSpPr/>
-        <p:nvPr/>
-      </p:nvGrpSpPr>
-      <p:grpSpPr>
-        <a:xfrm>
-          <a:off x="0" y="0"/>
-          <a:ext cx="0" cy="0"/>
-          <a:chOff x="0" y="0"/>
-          <a:chExt cx="0" cy="0"/>
-        </a:xfrm>
-      </p:grpSpPr>
-      <p:sp>
-        <p:nvSpPr>
-          <p:cNvPr id="2" name="Title 1"/>
-          <p:cNvSpPr>
-            <a:spLocks noGrp="1"/>
-          </p:cNvSpPr>
-          <p:nvPr>
-            <p:ph type="title"/>
-          </p:nvPr>
-        </p:nvSpPr>
-        <p:spPr/>
-        <p:txBody>
-          <a:bodyPr/>
-          <a:lstStyle/>
-          <a:p>
-            <a:r>
-              <a:rPr lang="en-US" dirty="0"/>
-              <a:t>Networking</a:t>
-            </a:r>
-          </a:p>
-        </p:txBody>
-      </p:sp>
-      <p:sp>
-        <p:nvSpPr>
-          <p:cNvPr id="3" name="Content Placeholder 2"/>
-          <p:cNvSpPr>
-            <a:spLocks noGrp="1"/>
-          </p:cNvSpPr>
-          <p:nvPr>
-            <p:ph idx="1"/>
-          </p:nvPr>
-        </p:nvSpPr>
-        <p:spPr>
-          <a:xfrm>
-            <a:off x="259975" y="1825624"/>
-            <a:ext cx="11761695" cy="4906869"/>
-          </a:xfrm>
-        </p:spPr>
-        <p:txBody>
-          <a:bodyPr/>
-          <a:lstStyle/>
-          <a:p>
-            <a:r>
-              <a:rPr lang="en-US" dirty="0"/>
-              <a:t>When you run a server on your local host, it will open a TCP port, typically 80 or 8080</a:t>
-            </a:r>
-          </a:p>
-          <a:p>
-            <a:r>
-              <a:rPr lang="en-US" dirty="0"/>
-              <a:t>A server running inside Docker will open the same kind of ports, but those will not be visible from the </a:t>
-            </a:r>
-            <a:r>
-              <a:rPr lang="en-US" i="1" dirty="0"/>
-              <a:t>host</a:t>
-            </a:r>
-            <a:r>
-              <a:rPr lang="en-US" dirty="0"/>
-              <a:t> OS</a:t>
-            </a:r>
-          </a:p>
-          <a:p>
-            <a:r>
-              <a:rPr lang="en-US" dirty="0"/>
-              <a:t>You need to explicitly make a mapping from </a:t>
-            </a:r>
-            <a:r>
-              <a:rPr lang="en-US" i="1" dirty="0"/>
-              <a:t>host </a:t>
-            </a:r>
-            <a:r>
-              <a:rPr lang="en-US" dirty="0"/>
-              <a:t>to </a:t>
-            </a:r>
-            <a:r>
-              <a:rPr lang="en-US" i="1" dirty="0"/>
-              <a:t>guest</a:t>
-            </a:r>
-            <a:r>
-              <a:rPr lang="en-US" dirty="0"/>
-              <a:t> ports</a:t>
-            </a:r>
-          </a:p>
-          <a:p>
-            <a:r>
-              <a:rPr lang="en-US" dirty="0"/>
-              <a:t>Ex.: </a:t>
-            </a:r>
-            <a:r>
-              <a:rPr lang="en-US" b="1" dirty="0" err="1"/>
-              <a:t>docker</a:t>
-            </a:r>
-            <a:r>
-              <a:rPr lang="en-US" b="1" dirty="0"/>
-              <a:t> run </a:t>
-            </a:r>
-            <a:r>
-              <a:rPr lang="mr-IN" b="1" dirty="0"/>
-              <a:t>–</a:t>
-            </a:r>
-            <a:r>
-              <a:rPr lang="en-US" b="1" dirty="0"/>
-              <a:t>p 80:8080 foo</a:t>
-            </a:r>
-          </a:p>
-          <a:p>
-            <a:pPr lvl="1"/>
-            <a:r>
-              <a:rPr lang="en-US" dirty="0"/>
-              <a:t>When we do a connection on localhost on port 80, it will be redirected to 8080 inside Docker</a:t>
-            </a:r>
-          </a:p>
-        </p:txBody>
-      </p:sp>
-    </p:spTree>
-    <p:extLst>
-      <p:ext uri="{BB962C8B-B14F-4D97-AF65-F5344CB8AC3E}">
-        <p14:creationId xmlns:p14="http://schemas.microsoft.com/office/powerpoint/2010/main" val="827690505"/>
-      </p:ext>
-    </p:extLst>
-  </p:cSld>
-  <p:clrMapOvr>
-    <a:masterClrMapping/>
-  </p:clrMapOvr>
-</p:sld>
-</file>
-
-<file path=ppt/slides/slide56.xml><?xml version="1.0" encoding="utf-8"?>
-<p:sld xmlns:a="http://schemas.openxmlformats.org/drawingml/2006/main" xmlns:r="http://schemas.openxmlformats.org/officeDocument/2006/relationships" xmlns:p="http://schemas.openxmlformats.org/presentationml/2006/main">
-  <p:cSld>
-    <p:spTree>
-      <p:nvGrpSpPr>
-        <p:cNvPr id="1" name=""/>
-        <p:cNvGrpSpPr/>
-        <p:nvPr/>
-      </p:nvGrpSpPr>
-      <p:grpSpPr>
-        <a:xfrm>
-          <a:off x="0" y="0"/>
-          <a:ext cx="0" cy="0"/>
-          <a:chOff x="0" y="0"/>
-          <a:chExt cx="0" cy="0"/>
-        </a:xfrm>
-      </p:grpSpPr>
-      <p:sp>
-        <p:nvSpPr>
-          <p:cNvPr id="2" name="Title 1"/>
-          <p:cNvSpPr>
-            <a:spLocks noGrp="1"/>
-          </p:cNvSpPr>
-          <p:nvPr>
-            <p:ph type="title"/>
-          </p:nvPr>
-        </p:nvSpPr>
-        <p:spPr/>
-        <p:txBody>
-          <a:bodyPr/>
-          <a:lstStyle/>
-          <a:p>
-            <a:r>
-              <a:rPr lang="en-US" dirty="0"/>
-              <a:t>CTRL-C</a:t>
-            </a:r>
-          </a:p>
-        </p:txBody>
-      </p:sp>
-      <p:sp>
-        <p:nvSpPr>
-          <p:cNvPr id="3" name="Content Placeholder 2"/>
-          <p:cNvSpPr>
-            <a:spLocks noGrp="1"/>
-          </p:cNvSpPr>
-          <p:nvPr>
-            <p:ph idx="1"/>
-          </p:nvPr>
-        </p:nvSpPr>
-        <p:spPr>
-          <a:xfrm>
-            <a:off x="243347" y="1825625"/>
-            <a:ext cx="11769213" cy="4899640"/>
-          </a:xfrm>
-        </p:spPr>
-        <p:txBody>
-          <a:bodyPr/>
-          <a:lstStyle/>
-          <a:p>
-            <a:r>
-              <a:rPr lang="en-US" dirty="0"/>
-              <a:t>When running Docker (</a:t>
-            </a:r>
-            <a:r>
-              <a:rPr lang="en-US" dirty="0" err="1"/>
-              <a:t>eg</a:t>
-            </a:r>
-            <a:r>
-              <a:rPr lang="en-US" dirty="0"/>
-              <a:t> “</a:t>
-            </a:r>
-            <a:r>
-              <a:rPr lang="en-US" i="1" dirty="0" err="1"/>
-              <a:t>docker</a:t>
-            </a:r>
-            <a:r>
-              <a:rPr lang="en-US" i="1" dirty="0"/>
-              <a:t> run</a:t>
-            </a:r>
-            <a:r>
-              <a:rPr lang="en-US" dirty="0"/>
-              <a:t>”) in a terminal, you can use CTRL-C to stop it</a:t>
-            </a:r>
-          </a:p>
-          <a:p>
-            <a:r>
-              <a:rPr lang="en-US" dirty="0"/>
-              <a:t>On Windows/</a:t>
-            </a:r>
-            <a:r>
-              <a:rPr lang="en-US" dirty="0" err="1"/>
-              <a:t>GitBash</a:t>
-            </a:r>
-            <a:r>
-              <a:rPr lang="en-US" dirty="0"/>
-              <a:t> it </a:t>
-            </a:r>
-            <a:r>
-              <a:rPr lang="en-US" i="1" dirty="0"/>
-              <a:t>might </a:t>
-            </a:r>
-            <a:r>
-              <a:rPr lang="en-US" dirty="0"/>
-              <a:t>happen that the image still run in background</a:t>
-            </a:r>
-          </a:p>
-          <a:p>
-            <a:r>
-              <a:rPr lang="en-US" dirty="0"/>
-              <a:t>Use “</a:t>
-            </a:r>
-            <a:r>
-              <a:rPr lang="en-US" i="1" dirty="0" err="1"/>
-              <a:t>docker</a:t>
-            </a:r>
-            <a:r>
-              <a:rPr lang="en-US" i="1" dirty="0"/>
-              <a:t> </a:t>
-            </a:r>
-            <a:r>
-              <a:rPr lang="en-US" i="1" dirty="0" err="1"/>
-              <a:t>ps</a:t>
-            </a:r>
-            <a:r>
-              <a:rPr lang="en-US" dirty="0"/>
-              <a:t>” to check if indeed the case</a:t>
-            </a:r>
-          </a:p>
-          <a:p>
-            <a:r>
-              <a:rPr lang="en-US" dirty="0"/>
-              <a:t>Use “</a:t>
-            </a:r>
-            <a:r>
-              <a:rPr lang="en-US" i="1" dirty="0" err="1"/>
-              <a:t>docker</a:t>
-            </a:r>
-            <a:r>
-              <a:rPr lang="en-US" i="1" dirty="0"/>
-              <a:t> stop &lt;id&gt;</a:t>
-            </a:r>
-            <a:r>
-              <a:rPr lang="en-US" dirty="0"/>
-              <a:t>” to stop an image manually</a:t>
-            </a:r>
-          </a:p>
-          <a:p>
-            <a:r>
-              <a:rPr lang="en-US" dirty="0"/>
-              <a:t>If you have Docker images running </a:t>
-            </a:r>
-            <a:r>
-              <a:rPr lang="en-US"/>
-              <a:t>in the background</a:t>
-            </a:r>
-            <a:r>
-              <a:rPr lang="en-US" dirty="0"/>
-              <a:t>, that can be a problem if they use TCP ports  </a:t>
-            </a:r>
-          </a:p>
-          <a:p>
-            <a:pPr marL="0" indent="0">
-              <a:buNone/>
-            </a:pPr>
-            <a:endParaRPr lang="en-US" dirty="0"/>
-          </a:p>
-        </p:txBody>
-      </p:sp>
-    </p:spTree>
-    <p:extLst>
-      <p:ext uri="{BB962C8B-B14F-4D97-AF65-F5344CB8AC3E}">
-        <p14:creationId xmlns:p14="http://schemas.microsoft.com/office/powerpoint/2010/main" val="1278498491"/>
-      </p:ext>
-    </p:extLst>
-  </p:cSld>
-  <p:clrMapOvr>
-    <a:masterClrMapping/>
-  </p:clrMapOvr>
-</p:sld>
-</file>
-
-<file path=ppt/slides/slide57.xml><?xml version="1.0" encoding="utf-8"?>
-<p:sld xmlns:a="http://schemas.openxmlformats.org/drawingml/2006/main" xmlns:r="http://schemas.openxmlformats.org/officeDocument/2006/relationships" xmlns:p="http://schemas.openxmlformats.org/presentationml/2006/main">
-  <p:cSld>
-    <p:spTree>
-      <p:nvGrpSpPr>
-        <p:cNvPr id="1" name=""/>
-        <p:cNvGrpSpPr/>
-        <p:nvPr/>
-      </p:nvGrpSpPr>
-      <p:grpSpPr>
-        <a:xfrm>
-          <a:off x="0" y="0"/>
-          <a:ext cx="0" cy="0"/>
-          <a:chOff x="0" y="0"/>
-          <a:chExt cx="0" cy="0"/>
-        </a:xfrm>
-      </p:grpSpPr>
-      <p:sp>
-        <p:nvSpPr>
-          <p:cNvPr id="2" name="Title 1"/>
-          <p:cNvSpPr>
-            <a:spLocks noGrp="1"/>
-          </p:cNvSpPr>
-          <p:nvPr>
-            <p:ph type="title"/>
-          </p:nvPr>
-        </p:nvSpPr>
-        <p:spPr/>
-        <p:txBody>
-          <a:bodyPr/>
-          <a:lstStyle/>
-          <a:p>
-            <a:r>
-              <a:rPr lang="en-US" dirty="0"/>
-              <a:t>Docker in This Course</a:t>
-            </a:r>
-          </a:p>
-        </p:txBody>
-      </p:sp>
-      <p:sp>
-        <p:nvSpPr>
-          <p:cNvPr id="3" name="Content Placeholder 2"/>
-          <p:cNvSpPr>
-            <a:spLocks noGrp="1"/>
-          </p:cNvSpPr>
-          <p:nvPr>
-            <p:ph idx="1"/>
-          </p:nvPr>
-        </p:nvSpPr>
-        <p:spPr>
-          <a:xfrm>
-            <a:off x="238539" y="1825624"/>
-            <a:ext cx="11820939" cy="4853472"/>
-          </a:xfrm>
-        </p:spPr>
-        <p:txBody>
-          <a:bodyPr>
-            <a:normAutofit lnSpcReduction="10000"/>
-          </a:bodyPr>
-          <a:lstStyle/>
-          <a:p>
-            <a:r>
-              <a:rPr lang="en-US" dirty="0"/>
-              <a:t>Java is quite portable… for monolithic Java servers (</a:t>
-            </a:r>
-            <a:r>
-              <a:rPr lang="en-US" dirty="0" err="1"/>
-              <a:t>ie</a:t>
-            </a:r>
-            <a:r>
-              <a:rPr lang="en-US" dirty="0"/>
-              <a:t> single applications), using Docker is not critical (compared to other languages/frameworks…)</a:t>
-            </a:r>
-          </a:p>
-          <a:p>
-            <a:r>
-              <a:rPr lang="en-US" dirty="0"/>
-              <a:t>But it simplify starting JEE Containers</a:t>
-            </a:r>
-          </a:p>
-          <a:p>
-            <a:r>
-              <a:rPr lang="en-US" dirty="0"/>
-              <a:t>We will also use it for databases (</a:t>
-            </a:r>
-            <a:r>
-              <a:rPr lang="en-US" dirty="0" err="1"/>
-              <a:t>eg</a:t>
-            </a:r>
-            <a:r>
-              <a:rPr lang="en-US" dirty="0"/>
-              <a:t> </a:t>
-            </a:r>
-            <a:r>
-              <a:rPr lang="en-US" dirty="0" err="1"/>
-              <a:t>Postgres</a:t>
-            </a:r>
-            <a:r>
-              <a:rPr lang="en-US" dirty="0"/>
-              <a:t>) and browsers (</a:t>
-            </a:r>
-            <a:r>
-              <a:rPr lang="en-US" dirty="0" err="1"/>
-              <a:t>eg</a:t>
-            </a:r>
-            <a:r>
-              <a:rPr lang="en-US" dirty="0"/>
-              <a:t> Chrome) for testing (</a:t>
-            </a:r>
-            <a:r>
-              <a:rPr lang="en-US" dirty="0" err="1"/>
-              <a:t>ie</a:t>
-            </a:r>
-            <a:r>
-              <a:rPr lang="en-US" dirty="0"/>
-              <a:t> Selenium) </a:t>
-            </a:r>
-          </a:p>
-          <a:p>
-            <a:r>
-              <a:rPr lang="en-US" dirty="0"/>
-              <a:t>Docker will be critical in </a:t>
-            </a:r>
-            <a:r>
-              <a:rPr lang="en-US" i="1" dirty="0"/>
-              <a:t>Enterprise 2</a:t>
-            </a:r>
-            <a:r>
-              <a:rPr lang="en-US" dirty="0"/>
-              <a:t>, when dealing with microservices </a:t>
-            </a:r>
-          </a:p>
-          <a:p>
-            <a:pPr lvl="1"/>
-            <a:r>
-              <a:rPr lang="en-US" dirty="0"/>
-              <a:t>where we will need to orchestrate many applications…</a:t>
-            </a:r>
-          </a:p>
-        </p:txBody>
-      </p:sp>
-    </p:spTree>
-    <p:extLst>
-      <p:ext uri="{BB962C8B-B14F-4D97-AF65-F5344CB8AC3E}">
-        <p14:creationId xmlns:p14="http://schemas.microsoft.com/office/powerpoint/2010/main" val="519128825"/>
-      </p:ext>
-    </p:extLst>
-  </p:cSld>
-  <p:clrMapOvr>
-    <a:masterClrMapping/>
-  </p:clrMapOvr>
-</p:sld>
-</file>
-
-<file path=ppt/slides/slide58.xml><?xml version="1.0" encoding="utf-8"?>
-<p:sld xmlns:a="http://schemas.openxmlformats.org/drawingml/2006/main" xmlns:r="http://schemas.openxmlformats.org/officeDocument/2006/relationships" xmlns:p="http://schemas.openxmlformats.org/presentationml/2006/main">
-  <p:cSld>
-    <p:spTree>
-      <p:nvGrpSpPr>
-        <p:cNvPr id="1" name=""/>
-        <p:cNvGrpSpPr/>
-        <p:nvPr/>
-      </p:nvGrpSpPr>
-      <p:grpSpPr>
-        <a:xfrm>
-          <a:off x="0" y="0"/>
-          <a:ext cx="0" cy="0"/>
-          <a:chOff x="0" y="0"/>
-          <a:chExt cx="0" cy="0"/>
-        </a:xfrm>
-      </p:grpSpPr>
-      <p:sp>
-        <p:nvSpPr>
-          <p:cNvPr id="4" name="Title 3"/>
-          <p:cNvSpPr>
-            <a:spLocks noGrp="1"/>
-          </p:cNvSpPr>
-          <p:nvPr>
-            <p:ph type="title"/>
-          </p:nvPr>
-        </p:nvSpPr>
-        <p:spPr/>
-        <p:txBody>
-          <a:bodyPr/>
-          <a:lstStyle/>
-          <a:p>
-            <a:r>
-              <a:rPr lang="en-US" dirty="0" err="1"/>
-              <a:t>Git</a:t>
-            </a:r>
-            <a:r>
-              <a:rPr lang="en-US" dirty="0"/>
-              <a:t> Repository Modules</a:t>
-            </a:r>
-          </a:p>
-        </p:txBody>
-      </p:sp>
-      <p:sp>
-        <p:nvSpPr>
-          <p:cNvPr id="5" name="Content Placeholder 4"/>
-          <p:cNvSpPr>
-            <a:spLocks noGrp="1"/>
-          </p:cNvSpPr>
-          <p:nvPr>
-            <p:ph idx="1"/>
-          </p:nvPr>
-        </p:nvSpPr>
-        <p:spPr>
-          <a:xfrm>
-            <a:off x="838200" y="1825625"/>
-            <a:ext cx="10515600" cy="4972740"/>
-          </a:xfrm>
-        </p:spPr>
-        <p:txBody>
-          <a:bodyPr>
-            <a:normAutofit/>
-          </a:bodyPr>
-          <a:lstStyle/>
-          <a:p>
-            <a:r>
-              <a:rPr lang="en-US" i="1" dirty="0"/>
-              <a:t>NOTE: most of the explanations will be directly in the code as comments, and not here in the slides</a:t>
-            </a:r>
-          </a:p>
-          <a:p>
-            <a:r>
-              <a:rPr lang="en-US" b="1" dirty="0"/>
-              <a:t>intro/</a:t>
-            </a:r>
-            <a:r>
-              <a:rPr lang="en-US" b="1" dirty="0" err="1"/>
-              <a:t>jee</a:t>
-            </a:r>
-            <a:r>
-              <a:rPr lang="en-US" b="1" dirty="0"/>
-              <a:t>/</a:t>
-            </a:r>
-            <a:r>
-              <a:rPr lang="en-US" b="1" dirty="0" err="1"/>
-              <a:t>jsf</a:t>
-            </a:r>
-            <a:r>
-              <a:rPr lang="en-US" b="1" dirty="0"/>
-              <a:t>/base</a:t>
-            </a:r>
-          </a:p>
-          <a:p>
-            <a:r>
-              <a:rPr lang="en-US" b="1" dirty="0"/>
-              <a:t>intro/</a:t>
-            </a:r>
-            <a:r>
-              <a:rPr lang="en-US" b="1" dirty="0" err="1"/>
-              <a:t>jee</a:t>
-            </a:r>
-            <a:r>
-              <a:rPr lang="en-US" b="1" dirty="0"/>
-              <a:t>/</a:t>
-            </a:r>
-            <a:r>
-              <a:rPr lang="en-US" b="1" dirty="0" err="1"/>
-              <a:t>jsf</a:t>
-            </a:r>
-            <a:r>
-              <a:rPr lang="en-US" b="1" dirty="0"/>
-              <a:t>/examples</a:t>
-            </a:r>
-          </a:p>
-          <a:p>
-            <a:r>
-              <a:rPr lang="en-US" dirty="0"/>
-              <a:t>Exercises for Lesson 07 (see documentation)</a:t>
-            </a:r>
-          </a:p>
-        </p:txBody>
-      </p:sp>
-    </p:spTree>
-    <p:extLst>
-      <p:ext uri="{BB962C8B-B14F-4D97-AF65-F5344CB8AC3E}">
-        <p14:creationId xmlns:p14="http://schemas.microsoft.com/office/powerpoint/2010/main" val="1023732187"/>
-      </p:ext>
-    </p:extLst>
-  </p:cSld>
-  <p:clrMapOvr>
-    <a:masterClrMapping/>
-  </p:clrMapOvr>
-</p:sld>
-</file>
-
 <file path=ppt/slides/slide6.xml><?xml version="1.0" encoding="utf-8"?>
 <p:sld xmlns:a="http://schemas.openxmlformats.org/drawingml/2006/main" xmlns:r="http://schemas.openxmlformats.org/officeDocument/2006/relationships" xmlns:p="http://schemas.openxmlformats.org/presentationml/2006/main">
   <p:cSld>
@@ -12279,6 +12284,801 @@
     <p:extLst>
       <p:ext uri="{BB962C8B-B14F-4D97-AF65-F5344CB8AC3E}">
         <p14:creationId xmlns:p14="http://schemas.microsoft.com/office/powerpoint/2010/main" val="2056426225"/>
+      </p:ext>
+    </p:extLst>
+  </p:cSld>
+  <p:clrMapOvr>
+    <a:masterClrMapping/>
+  </p:clrMapOvr>
+</p:sld>
+</file>
+
+<file path=ppt/slides/slide60.xml><?xml version="1.0" encoding="utf-8"?>
+<p:sld xmlns:a="http://schemas.openxmlformats.org/drawingml/2006/main" xmlns:r="http://schemas.openxmlformats.org/officeDocument/2006/relationships" xmlns:p="http://schemas.openxmlformats.org/presentationml/2006/main">
+  <p:cSld>
+    <p:spTree>
+      <p:nvGrpSpPr>
+        <p:cNvPr id="1" name=""/>
+        <p:cNvGrpSpPr/>
+        <p:nvPr/>
+      </p:nvGrpSpPr>
+      <p:grpSpPr>
+        <a:xfrm>
+          <a:off x="0" y="0"/>
+          <a:ext cx="0" cy="0"/>
+          <a:chOff x="0" y="0"/>
+          <a:chExt cx="0" cy="0"/>
+        </a:xfrm>
+      </p:grpSpPr>
+      <p:sp>
+        <p:nvSpPr>
+          <p:cNvPr id="2" name="Title 1"/>
+          <p:cNvSpPr>
+            <a:spLocks noGrp="1"/>
+          </p:cNvSpPr>
+          <p:nvPr>
+            <p:ph type="title"/>
+          </p:nvPr>
+        </p:nvSpPr>
+        <p:spPr/>
+        <p:txBody>
+          <a:bodyPr/>
+          <a:lstStyle/>
+          <a:p>
+            <a:r>
+              <a:rPr lang="en-US" dirty="0"/>
+              <a:t>Docker Commands</a:t>
+            </a:r>
+          </a:p>
+        </p:txBody>
+      </p:sp>
+      <p:sp>
+        <p:nvSpPr>
+          <p:cNvPr id="3" name="Content Placeholder 2"/>
+          <p:cNvSpPr>
+            <a:spLocks noGrp="1"/>
+          </p:cNvSpPr>
+          <p:nvPr>
+            <p:ph idx="1"/>
+          </p:nvPr>
+        </p:nvSpPr>
+        <p:spPr>
+          <a:xfrm>
+            <a:off x="265043" y="1825625"/>
+            <a:ext cx="11794435" cy="4932984"/>
+          </a:xfrm>
+        </p:spPr>
+        <p:txBody>
+          <a:bodyPr>
+            <a:normAutofit fontScale="92500"/>
+          </a:bodyPr>
+          <a:lstStyle/>
+          <a:p>
+            <a:r>
+              <a:rPr lang="en-US" b="1" i="1" dirty="0" err="1"/>
+              <a:t>docker</a:t>
+            </a:r>
+            <a:r>
+              <a:rPr lang="en-US" b="1" i="1" dirty="0"/>
+              <a:t> build -t &lt;name&gt; .</a:t>
+            </a:r>
+          </a:p>
+          <a:p>
+            <a:pPr lvl="1"/>
+            <a:r>
+              <a:rPr lang="en-US" dirty="0"/>
+              <a:t>Create an image with name &lt;</a:t>
+            </a:r>
+            <a:r>
+              <a:rPr lang="en-US" i="1" dirty="0"/>
+              <a:t>name</a:t>
+            </a:r>
+            <a:r>
+              <a:rPr lang="en-US" dirty="0"/>
+              <a:t>&gt;, from the </a:t>
+            </a:r>
+            <a:r>
+              <a:rPr lang="en-US" i="1" dirty="0" err="1"/>
+              <a:t>Dockerfile</a:t>
+            </a:r>
+            <a:r>
+              <a:rPr lang="en-US" dirty="0"/>
+              <a:t> in the current “.” folder</a:t>
+            </a:r>
+          </a:p>
+          <a:p>
+            <a:r>
+              <a:rPr lang="en-US" b="1" i="1" dirty="0" err="1"/>
+              <a:t>docker</a:t>
+            </a:r>
+            <a:r>
+              <a:rPr lang="en-US" b="1" i="1" dirty="0"/>
+              <a:t> run &lt;name&gt;</a:t>
+            </a:r>
+          </a:p>
+          <a:p>
+            <a:pPr lvl="1"/>
+            <a:r>
+              <a:rPr lang="en-US" dirty="0"/>
+              <a:t>Run the given image</a:t>
+            </a:r>
+          </a:p>
+          <a:p>
+            <a:r>
+              <a:rPr lang="en-US" b="1" dirty="0" err="1"/>
+              <a:t>docker</a:t>
+            </a:r>
+            <a:r>
+              <a:rPr lang="en-US" b="1" dirty="0"/>
+              <a:t> </a:t>
+            </a:r>
+            <a:r>
+              <a:rPr lang="en-US" b="1" dirty="0" err="1"/>
+              <a:t>ps</a:t>
+            </a:r>
+            <a:endParaRPr lang="en-US" b="1" dirty="0"/>
+          </a:p>
+          <a:p>
+            <a:pPr lvl="1"/>
+            <a:r>
+              <a:rPr lang="en-US" dirty="0"/>
+              <a:t>Show running images</a:t>
+            </a:r>
+          </a:p>
+          <a:p>
+            <a:r>
+              <a:rPr lang="en-US" b="1" dirty="0" err="1"/>
+              <a:t>docker</a:t>
+            </a:r>
+            <a:r>
+              <a:rPr lang="en-US" b="1" dirty="0"/>
+              <a:t> stop &lt;id&gt;</a:t>
+            </a:r>
+          </a:p>
+          <a:p>
+            <a:pPr lvl="1"/>
+            <a:r>
+              <a:rPr lang="en-US" dirty="0"/>
+              <a:t>Stop the given running image. Note: an image can be run in several instances, with different ids</a:t>
+            </a:r>
+          </a:p>
+          <a:p>
+            <a:r>
+              <a:rPr lang="en-US" dirty="0"/>
+              <a:t>In IntelliJ, you can also install “</a:t>
+            </a:r>
+            <a:r>
+              <a:rPr lang="en-US" i="1" dirty="0"/>
+              <a:t>Docker integration</a:t>
+            </a:r>
+            <a:r>
+              <a:rPr lang="en-US" dirty="0"/>
+              <a:t>” plugin</a:t>
+            </a:r>
+          </a:p>
+          <a:p>
+            <a:endParaRPr lang="en-US" dirty="0"/>
+          </a:p>
+        </p:txBody>
+      </p:sp>
+    </p:spTree>
+    <p:extLst>
+      <p:ext uri="{BB962C8B-B14F-4D97-AF65-F5344CB8AC3E}">
+        <p14:creationId xmlns:p14="http://schemas.microsoft.com/office/powerpoint/2010/main" val="3257655982"/>
+      </p:ext>
+    </p:extLst>
+  </p:cSld>
+  <p:clrMapOvr>
+    <a:masterClrMapping/>
+  </p:clrMapOvr>
+</p:sld>
+</file>
+
+<file path=ppt/slides/slide61.xml><?xml version="1.0" encoding="utf-8"?>
+<p:sld xmlns:a="http://schemas.openxmlformats.org/drawingml/2006/main" xmlns:r="http://schemas.openxmlformats.org/officeDocument/2006/relationships" xmlns:p="http://schemas.openxmlformats.org/presentationml/2006/main">
+  <p:cSld>
+    <p:spTree>
+      <p:nvGrpSpPr>
+        <p:cNvPr id="1" name=""/>
+        <p:cNvGrpSpPr/>
+        <p:nvPr/>
+      </p:nvGrpSpPr>
+      <p:grpSpPr>
+        <a:xfrm>
+          <a:off x="0" y="0"/>
+          <a:ext cx="0" cy="0"/>
+          <a:chOff x="0" y="0"/>
+          <a:chExt cx="0" cy="0"/>
+        </a:xfrm>
+      </p:grpSpPr>
+      <p:sp>
+        <p:nvSpPr>
+          <p:cNvPr id="2" name="Title 1"/>
+          <p:cNvSpPr>
+            <a:spLocks noGrp="1"/>
+          </p:cNvSpPr>
+          <p:nvPr>
+            <p:ph type="title"/>
+          </p:nvPr>
+        </p:nvSpPr>
+        <p:spPr/>
+        <p:txBody>
+          <a:bodyPr/>
+          <a:lstStyle/>
+          <a:p>
+            <a:r>
+              <a:rPr lang="en-US" dirty="0"/>
+              <a:t>Networking</a:t>
+            </a:r>
+          </a:p>
+        </p:txBody>
+      </p:sp>
+      <p:sp>
+        <p:nvSpPr>
+          <p:cNvPr id="3" name="Content Placeholder 2"/>
+          <p:cNvSpPr>
+            <a:spLocks noGrp="1"/>
+          </p:cNvSpPr>
+          <p:nvPr>
+            <p:ph idx="1"/>
+          </p:nvPr>
+        </p:nvSpPr>
+        <p:spPr>
+          <a:xfrm>
+            <a:off x="259975" y="1825624"/>
+            <a:ext cx="11761695" cy="4906869"/>
+          </a:xfrm>
+        </p:spPr>
+        <p:txBody>
+          <a:bodyPr/>
+          <a:lstStyle/>
+          <a:p>
+            <a:r>
+              <a:rPr lang="en-US" dirty="0"/>
+              <a:t>When you run a server on your local host, it will open a TCP port, typically 80 or 8080</a:t>
+            </a:r>
+          </a:p>
+          <a:p>
+            <a:r>
+              <a:rPr lang="en-US" dirty="0"/>
+              <a:t>A server running inside Docker will open the same kind of ports, but those will not be visible from the </a:t>
+            </a:r>
+            <a:r>
+              <a:rPr lang="en-US" i="1" dirty="0"/>
+              <a:t>host</a:t>
+            </a:r>
+            <a:r>
+              <a:rPr lang="en-US" dirty="0"/>
+              <a:t> OS</a:t>
+            </a:r>
+          </a:p>
+          <a:p>
+            <a:r>
+              <a:rPr lang="en-US" dirty="0"/>
+              <a:t>You need to explicitly make a mapping from </a:t>
+            </a:r>
+            <a:r>
+              <a:rPr lang="en-US" i="1" dirty="0"/>
+              <a:t>host </a:t>
+            </a:r>
+            <a:r>
+              <a:rPr lang="en-US" dirty="0"/>
+              <a:t>to </a:t>
+            </a:r>
+            <a:r>
+              <a:rPr lang="en-US" i="1" dirty="0"/>
+              <a:t>guest</a:t>
+            </a:r>
+            <a:r>
+              <a:rPr lang="en-US" dirty="0"/>
+              <a:t> ports</a:t>
+            </a:r>
+          </a:p>
+          <a:p>
+            <a:r>
+              <a:rPr lang="en-US" dirty="0"/>
+              <a:t>Ex.: </a:t>
+            </a:r>
+            <a:r>
+              <a:rPr lang="en-US" b="1" dirty="0" err="1"/>
+              <a:t>docker</a:t>
+            </a:r>
+            <a:r>
+              <a:rPr lang="en-US" b="1" dirty="0"/>
+              <a:t> run </a:t>
+            </a:r>
+            <a:r>
+              <a:rPr lang="mr-IN" b="1" dirty="0"/>
+              <a:t>–</a:t>
+            </a:r>
+            <a:r>
+              <a:rPr lang="en-US" b="1" dirty="0"/>
+              <a:t>p 80:8080 foo</a:t>
+            </a:r>
+          </a:p>
+          <a:p>
+            <a:pPr lvl="1"/>
+            <a:r>
+              <a:rPr lang="en-US" dirty="0"/>
+              <a:t>When we do a connection on localhost on port 80, it will be redirected to 8080 inside Docker</a:t>
+            </a:r>
+          </a:p>
+        </p:txBody>
+      </p:sp>
+    </p:spTree>
+    <p:extLst>
+      <p:ext uri="{BB962C8B-B14F-4D97-AF65-F5344CB8AC3E}">
+        <p14:creationId xmlns:p14="http://schemas.microsoft.com/office/powerpoint/2010/main" val="827690505"/>
+      </p:ext>
+    </p:extLst>
+  </p:cSld>
+  <p:clrMapOvr>
+    <a:masterClrMapping/>
+  </p:clrMapOvr>
+</p:sld>
+</file>
+
+<file path=ppt/slides/slide62.xml><?xml version="1.0" encoding="utf-8"?>
+<p:sld xmlns:a="http://schemas.openxmlformats.org/drawingml/2006/main" xmlns:r="http://schemas.openxmlformats.org/officeDocument/2006/relationships" xmlns:p="http://schemas.openxmlformats.org/presentationml/2006/main">
+  <p:cSld>
+    <p:spTree>
+      <p:nvGrpSpPr>
+        <p:cNvPr id="1" name=""/>
+        <p:cNvGrpSpPr/>
+        <p:nvPr/>
+      </p:nvGrpSpPr>
+      <p:grpSpPr>
+        <a:xfrm>
+          <a:off x="0" y="0"/>
+          <a:ext cx="0" cy="0"/>
+          <a:chOff x="0" y="0"/>
+          <a:chExt cx="0" cy="0"/>
+        </a:xfrm>
+      </p:grpSpPr>
+      <p:sp>
+        <p:nvSpPr>
+          <p:cNvPr id="2" name="Title 1"/>
+          <p:cNvSpPr>
+            <a:spLocks noGrp="1"/>
+          </p:cNvSpPr>
+          <p:nvPr>
+            <p:ph type="title"/>
+          </p:nvPr>
+        </p:nvSpPr>
+        <p:spPr/>
+        <p:txBody>
+          <a:bodyPr/>
+          <a:lstStyle/>
+          <a:p>
+            <a:r>
+              <a:rPr lang="en-US" dirty="0"/>
+              <a:t>CTRL-C</a:t>
+            </a:r>
+          </a:p>
+        </p:txBody>
+      </p:sp>
+      <p:sp>
+        <p:nvSpPr>
+          <p:cNvPr id="3" name="Content Placeholder 2"/>
+          <p:cNvSpPr>
+            <a:spLocks noGrp="1"/>
+          </p:cNvSpPr>
+          <p:nvPr>
+            <p:ph idx="1"/>
+          </p:nvPr>
+        </p:nvSpPr>
+        <p:spPr>
+          <a:xfrm>
+            <a:off x="243347" y="1825625"/>
+            <a:ext cx="11769213" cy="4899640"/>
+          </a:xfrm>
+        </p:spPr>
+        <p:txBody>
+          <a:bodyPr/>
+          <a:lstStyle/>
+          <a:p>
+            <a:r>
+              <a:rPr lang="en-US" dirty="0"/>
+              <a:t>When running Docker (</a:t>
+            </a:r>
+            <a:r>
+              <a:rPr lang="en-US" dirty="0" err="1"/>
+              <a:t>eg</a:t>
+            </a:r>
+            <a:r>
+              <a:rPr lang="en-US" dirty="0"/>
+              <a:t> “</a:t>
+            </a:r>
+            <a:r>
+              <a:rPr lang="en-US" i="1" dirty="0" err="1"/>
+              <a:t>docker</a:t>
+            </a:r>
+            <a:r>
+              <a:rPr lang="en-US" i="1" dirty="0"/>
+              <a:t> run</a:t>
+            </a:r>
+            <a:r>
+              <a:rPr lang="en-US" dirty="0"/>
+              <a:t>”) in a terminal, you can use CTRL-C to stop it</a:t>
+            </a:r>
+          </a:p>
+          <a:p>
+            <a:r>
+              <a:rPr lang="en-US" dirty="0"/>
+              <a:t>On Windows/</a:t>
+            </a:r>
+            <a:r>
+              <a:rPr lang="en-US" dirty="0" err="1"/>
+              <a:t>GitBash</a:t>
+            </a:r>
+            <a:r>
+              <a:rPr lang="en-US" dirty="0"/>
+              <a:t> it </a:t>
+            </a:r>
+            <a:r>
+              <a:rPr lang="en-US" i="1" dirty="0"/>
+              <a:t>might </a:t>
+            </a:r>
+            <a:r>
+              <a:rPr lang="en-US" dirty="0"/>
+              <a:t>happen that the image still run in background</a:t>
+            </a:r>
+          </a:p>
+          <a:p>
+            <a:r>
+              <a:rPr lang="en-US" dirty="0"/>
+              <a:t>Use “</a:t>
+            </a:r>
+            <a:r>
+              <a:rPr lang="en-US" i="1" dirty="0" err="1"/>
+              <a:t>docker</a:t>
+            </a:r>
+            <a:r>
+              <a:rPr lang="en-US" i="1" dirty="0"/>
+              <a:t> </a:t>
+            </a:r>
+            <a:r>
+              <a:rPr lang="en-US" i="1" dirty="0" err="1"/>
+              <a:t>ps</a:t>
+            </a:r>
+            <a:r>
+              <a:rPr lang="en-US" dirty="0"/>
+              <a:t>” to check if indeed the case</a:t>
+            </a:r>
+          </a:p>
+          <a:p>
+            <a:r>
+              <a:rPr lang="en-US" dirty="0"/>
+              <a:t>Use “</a:t>
+            </a:r>
+            <a:r>
+              <a:rPr lang="en-US" i="1" dirty="0" err="1"/>
+              <a:t>docker</a:t>
+            </a:r>
+            <a:r>
+              <a:rPr lang="en-US" i="1" dirty="0"/>
+              <a:t> stop &lt;id&gt;</a:t>
+            </a:r>
+            <a:r>
+              <a:rPr lang="en-US" dirty="0"/>
+              <a:t>” to stop an image manually</a:t>
+            </a:r>
+          </a:p>
+          <a:p>
+            <a:r>
+              <a:rPr lang="en-US" dirty="0"/>
+              <a:t>If you have Docker images running </a:t>
+            </a:r>
+            <a:r>
+              <a:rPr lang="en-US"/>
+              <a:t>in the background</a:t>
+            </a:r>
+            <a:r>
+              <a:rPr lang="en-US" dirty="0"/>
+              <a:t>, that can be a problem if they use TCP ports  </a:t>
+            </a:r>
+          </a:p>
+          <a:p>
+            <a:pPr marL="0" indent="0">
+              <a:buNone/>
+            </a:pPr>
+            <a:endParaRPr lang="en-US" dirty="0"/>
+          </a:p>
+        </p:txBody>
+      </p:sp>
+    </p:spTree>
+    <p:extLst>
+      <p:ext uri="{BB962C8B-B14F-4D97-AF65-F5344CB8AC3E}">
+        <p14:creationId xmlns:p14="http://schemas.microsoft.com/office/powerpoint/2010/main" val="1278498491"/>
+      </p:ext>
+    </p:extLst>
+  </p:cSld>
+  <p:clrMapOvr>
+    <a:masterClrMapping/>
+  </p:clrMapOvr>
+</p:sld>
+</file>
+
+<file path=ppt/slides/slide63.xml><?xml version="1.0" encoding="utf-8"?>
+<p:sld xmlns:a="http://schemas.openxmlformats.org/drawingml/2006/main" xmlns:r="http://schemas.openxmlformats.org/officeDocument/2006/relationships" xmlns:p="http://schemas.openxmlformats.org/presentationml/2006/main">
+  <p:cSld>
+    <p:spTree>
+      <p:nvGrpSpPr>
+        <p:cNvPr id="1" name=""/>
+        <p:cNvGrpSpPr/>
+        <p:nvPr/>
+      </p:nvGrpSpPr>
+      <p:grpSpPr>
+        <a:xfrm>
+          <a:off x="0" y="0"/>
+          <a:ext cx="0" cy="0"/>
+          <a:chOff x="0" y="0"/>
+          <a:chExt cx="0" cy="0"/>
+        </a:xfrm>
+      </p:grpSpPr>
+      <p:sp>
+        <p:nvSpPr>
+          <p:cNvPr id="2" name="Title 1"/>
+          <p:cNvSpPr>
+            <a:spLocks noGrp="1"/>
+          </p:cNvSpPr>
+          <p:nvPr>
+            <p:ph type="title"/>
+          </p:nvPr>
+        </p:nvSpPr>
+        <p:spPr/>
+        <p:txBody>
+          <a:bodyPr/>
+          <a:lstStyle/>
+          <a:p>
+            <a:r>
+              <a:rPr lang="en-US" dirty="0"/>
+              <a:t>Docker in This Course</a:t>
+            </a:r>
+          </a:p>
+        </p:txBody>
+      </p:sp>
+      <p:sp>
+        <p:nvSpPr>
+          <p:cNvPr id="3" name="Content Placeholder 2"/>
+          <p:cNvSpPr>
+            <a:spLocks noGrp="1"/>
+          </p:cNvSpPr>
+          <p:nvPr>
+            <p:ph idx="1"/>
+          </p:nvPr>
+        </p:nvSpPr>
+        <p:spPr>
+          <a:xfrm>
+            <a:off x="238539" y="1825624"/>
+            <a:ext cx="11820939" cy="4853472"/>
+          </a:xfrm>
+        </p:spPr>
+        <p:txBody>
+          <a:bodyPr>
+            <a:normAutofit lnSpcReduction="10000"/>
+          </a:bodyPr>
+          <a:lstStyle/>
+          <a:p>
+            <a:r>
+              <a:rPr lang="en-US" dirty="0"/>
+              <a:t>Java is quite portable… for monolithic Java servers (</a:t>
+            </a:r>
+            <a:r>
+              <a:rPr lang="en-US" dirty="0" err="1"/>
+              <a:t>ie</a:t>
+            </a:r>
+            <a:r>
+              <a:rPr lang="en-US" dirty="0"/>
+              <a:t> single applications), using Docker is not critical (compared to other languages/frameworks…)</a:t>
+            </a:r>
+          </a:p>
+          <a:p>
+            <a:r>
+              <a:rPr lang="en-US" dirty="0"/>
+              <a:t>But it simplify starting JEE Containers</a:t>
+            </a:r>
+          </a:p>
+          <a:p>
+            <a:r>
+              <a:rPr lang="en-US" dirty="0"/>
+              <a:t>We will also use it for databases (</a:t>
+            </a:r>
+            <a:r>
+              <a:rPr lang="en-US" dirty="0" err="1"/>
+              <a:t>eg</a:t>
+            </a:r>
+            <a:r>
+              <a:rPr lang="en-US" dirty="0"/>
+              <a:t> </a:t>
+            </a:r>
+            <a:r>
+              <a:rPr lang="en-US" dirty="0" err="1"/>
+              <a:t>Postgres</a:t>
+            </a:r>
+            <a:r>
+              <a:rPr lang="en-US" dirty="0"/>
+              <a:t>) and browsers (</a:t>
+            </a:r>
+            <a:r>
+              <a:rPr lang="en-US" dirty="0" err="1"/>
+              <a:t>eg</a:t>
+            </a:r>
+            <a:r>
+              <a:rPr lang="en-US" dirty="0"/>
+              <a:t> Chrome) for testing (</a:t>
+            </a:r>
+            <a:r>
+              <a:rPr lang="en-US" dirty="0" err="1"/>
+              <a:t>ie</a:t>
+            </a:r>
+            <a:r>
+              <a:rPr lang="en-US" dirty="0"/>
+              <a:t> Selenium) </a:t>
+            </a:r>
+          </a:p>
+          <a:p>
+            <a:r>
+              <a:rPr lang="en-US" dirty="0"/>
+              <a:t>Docker will be critical in </a:t>
+            </a:r>
+            <a:r>
+              <a:rPr lang="en-US" i="1" dirty="0"/>
+              <a:t>Enterprise 2</a:t>
+            </a:r>
+            <a:r>
+              <a:rPr lang="en-US" dirty="0"/>
+              <a:t>, when dealing with microservices </a:t>
+            </a:r>
+          </a:p>
+          <a:p>
+            <a:pPr lvl="1"/>
+            <a:r>
+              <a:rPr lang="en-US" dirty="0"/>
+              <a:t>where we will need to orchestrate many applications…</a:t>
+            </a:r>
+          </a:p>
+        </p:txBody>
+      </p:sp>
+    </p:spTree>
+    <p:extLst>
+      <p:ext uri="{BB962C8B-B14F-4D97-AF65-F5344CB8AC3E}">
+        <p14:creationId xmlns:p14="http://schemas.microsoft.com/office/powerpoint/2010/main" val="519128825"/>
+      </p:ext>
+    </p:extLst>
+  </p:cSld>
+  <p:clrMapOvr>
+    <a:masterClrMapping/>
+  </p:clrMapOvr>
+</p:sld>
+</file>
+
+<file path=ppt/slides/slide64.xml><?xml version="1.0" encoding="utf-8"?>
+<p:sld xmlns:a="http://schemas.openxmlformats.org/drawingml/2006/main" xmlns:r="http://schemas.openxmlformats.org/officeDocument/2006/relationships" xmlns:p="http://schemas.openxmlformats.org/presentationml/2006/main">
+  <p:cSld>
+    <p:spTree>
+      <p:nvGrpSpPr>
+        <p:cNvPr id="1" name=""/>
+        <p:cNvGrpSpPr/>
+        <p:nvPr/>
+      </p:nvGrpSpPr>
+      <p:grpSpPr>
+        <a:xfrm>
+          <a:off x="0" y="0"/>
+          <a:ext cx="0" cy="0"/>
+          <a:chOff x="0" y="0"/>
+          <a:chExt cx="0" cy="0"/>
+        </a:xfrm>
+      </p:grpSpPr>
+      <p:sp>
+        <p:nvSpPr>
+          <p:cNvPr id="4" name="Title 3"/>
+          <p:cNvSpPr>
+            <a:spLocks noGrp="1"/>
+          </p:cNvSpPr>
+          <p:nvPr>
+            <p:ph type="title"/>
+          </p:nvPr>
+        </p:nvSpPr>
+        <p:spPr/>
+        <p:txBody>
+          <a:bodyPr/>
+          <a:lstStyle/>
+          <a:p>
+            <a:r>
+              <a:rPr lang="en-US" dirty="0" err="1"/>
+              <a:t>Git</a:t>
+            </a:r>
+            <a:r>
+              <a:rPr lang="en-US" dirty="0"/>
+              <a:t> Repository Modules</a:t>
+            </a:r>
+          </a:p>
+        </p:txBody>
+      </p:sp>
+      <p:sp>
+        <p:nvSpPr>
+          <p:cNvPr id="5" name="Content Placeholder 4"/>
+          <p:cNvSpPr>
+            <a:spLocks noGrp="1"/>
+          </p:cNvSpPr>
+          <p:nvPr>
+            <p:ph idx="1"/>
+          </p:nvPr>
+        </p:nvSpPr>
+        <p:spPr>
+          <a:xfrm>
+            <a:off x="838200" y="1825625"/>
+            <a:ext cx="10515600" cy="4972740"/>
+          </a:xfrm>
+        </p:spPr>
+        <p:txBody>
+          <a:bodyPr>
+            <a:normAutofit/>
+          </a:bodyPr>
+          <a:lstStyle/>
+          <a:p>
+            <a:r>
+              <a:rPr lang="en-US" i="1" dirty="0"/>
+              <a:t>NOTE: most of the explanations will be directly in the code as comments, and not here in the slides</a:t>
+            </a:r>
+          </a:p>
+          <a:p>
+            <a:r>
+              <a:rPr lang="en-US" b="1" dirty="0"/>
+              <a:t>intro/</a:t>
+            </a:r>
+            <a:r>
+              <a:rPr lang="en-US" b="1" dirty="0" err="1"/>
+              <a:t>jee</a:t>
+            </a:r>
+            <a:r>
+              <a:rPr lang="en-US" b="1" dirty="0"/>
+              <a:t>/</a:t>
+            </a:r>
+            <a:r>
+              <a:rPr lang="en-US" b="1" dirty="0" err="1"/>
+              <a:t>jsf</a:t>
+            </a:r>
+            <a:r>
+              <a:rPr lang="en-US" b="1" dirty="0"/>
+              <a:t>/base</a:t>
+            </a:r>
+          </a:p>
+          <a:p>
+            <a:r>
+              <a:rPr lang="en-US" b="1" dirty="0"/>
+              <a:t>intro/</a:t>
+            </a:r>
+            <a:r>
+              <a:rPr lang="en-US" b="1" dirty="0" err="1"/>
+              <a:t>jee</a:t>
+            </a:r>
+            <a:r>
+              <a:rPr lang="en-US" b="1" dirty="0"/>
+              <a:t>/</a:t>
+            </a:r>
+            <a:r>
+              <a:rPr lang="en-US" b="1" dirty="0" err="1"/>
+              <a:t>jsf</a:t>
+            </a:r>
+            <a:r>
+              <a:rPr lang="en-US" b="1" dirty="0"/>
+              <a:t>/examples</a:t>
+            </a:r>
+          </a:p>
+          <a:p>
+            <a:r>
+              <a:rPr lang="en-US" dirty="0"/>
+              <a:t>Exercises for Lesson 07 (see documentation)</a:t>
+            </a:r>
+          </a:p>
+        </p:txBody>
+      </p:sp>
+    </p:spTree>
+    <p:extLst>
+      <p:ext uri="{BB962C8B-B14F-4D97-AF65-F5344CB8AC3E}">
+        <p14:creationId xmlns:p14="http://schemas.microsoft.com/office/powerpoint/2010/main" val="1023732187"/>
       </p:ext>
     </p:extLst>
   </p:cSld>

</xml_diff>

<commit_message>
updated slides for les 07
</commit_message>
<xml_diff>
--- a/doc/intro/slides/lesson_07_jsf.pptx
+++ b/doc/intro/slides/lesson_07_jsf.pptx
@@ -5,7 +5,7 @@
     <p:sldMasterId id="2147483648" r:id="rId1"/>
   </p:sldMasterIdLst>
   <p:notesMasterIdLst>
-    <p:notesMasterId r:id="rId66"/>
+    <p:notesMasterId r:id="rId64"/>
   </p:notesMasterIdLst>
   <p:sldIdLst>
     <p:sldId id="256" r:id="rId2"/>
@@ -57,21 +57,19 @@
     <p:sldId id="433" r:id="rId48"/>
     <p:sldId id="432" r:id="rId49"/>
     <p:sldId id="436" r:id="rId50"/>
-    <p:sldId id="434" r:id="rId51"/>
-    <p:sldId id="435" r:id="rId52"/>
-    <p:sldId id="326" r:id="rId53"/>
-    <p:sldId id="336" r:id="rId54"/>
-    <p:sldId id="337" r:id="rId55"/>
-    <p:sldId id="338" r:id="rId56"/>
-    <p:sldId id="339" r:id="rId57"/>
-    <p:sldId id="340" r:id="rId58"/>
-    <p:sldId id="341" r:id="rId59"/>
-    <p:sldId id="342" r:id="rId60"/>
-    <p:sldId id="345" r:id="rId61"/>
-    <p:sldId id="424" r:id="rId62"/>
-    <p:sldId id="430" r:id="rId63"/>
-    <p:sldId id="334" r:id="rId64"/>
-    <p:sldId id="271" r:id="rId65"/>
+    <p:sldId id="326" r:id="rId51"/>
+    <p:sldId id="336" r:id="rId52"/>
+    <p:sldId id="337" r:id="rId53"/>
+    <p:sldId id="338" r:id="rId54"/>
+    <p:sldId id="339" r:id="rId55"/>
+    <p:sldId id="340" r:id="rId56"/>
+    <p:sldId id="341" r:id="rId57"/>
+    <p:sldId id="342" r:id="rId58"/>
+    <p:sldId id="345" r:id="rId59"/>
+    <p:sldId id="424" r:id="rId60"/>
+    <p:sldId id="430" r:id="rId61"/>
+    <p:sldId id="334" r:id="rId62"/>
+    <p:sldId id="271" r:id="rId63"/>
   </p:sldIdLst>
   <p:sldSz cx="12192000" cy="6858000"/>
   <p:notesSz cx="6858000" cy="9144000"/>
@@ -260,7 +258,7 @@
           <a:p>
             <a:fld id="{9B5B52BA-3295-0343-9E28-A260A811DD10}" type="datetimeFigureOut">
               <a:rPr lang="en-US" smtClean="0"/>
-              <a:t>2/20/19</a:t>
+              <a:t>25-Feb-19</a:t>
             </a:fld>
             <a:endParaRPr lang="en-US"/>
           </a:p>
@@ -656,7 +654,7 @@
           <a:p>
             <a:fld id="{04F1D4A2-813C-F741-B481-C92B3A596030}" type="datetimeFigureOut">
               <a:rPr lang="en-US" smtClean="0"/>
-              <a:t>2/20/19</a:t>
+              <a:t>25-Feb-19</a:t>
             </a:fld>
             <a:endParaRPr lang="en-US"/>
           </a:p>
@@ -824,7 +822,7 @@
           <a:p>
             <a:fld id="{04F1D4A2-813C-F741-B481-C92B3A596030}" type="datetimeFigureOut">
               <a:rPr lang="en-US" smtClean="0"/>
-              <a:t>2/20/19</a:t>
+              <a:t>25-Feb-19</a:t>
             </a:fld>
             <a:endParaRPr lang="en-US"/>
           </a:p>
@@ -1002,7 +1000,7 @@
           <a:p>
             <a:fld id="{04F1D4A2-813C-F741-B481-C92B3A596030}" type="datetimeFigureOut">
               <a:rPr lang="en-US" smtClean="0"/>
-              <a:t>2/20/19</a:t>
+              <a:t>25-Feb-19</a:t>
             </a:fld>
             <a:endParaRPr lang="en-US"/>
           </a:p>
@@ -1181,7 +1179,7 @@
           <a:p>
             <a:fld id="{04F1D4A2-813C-F741-B481-C92B3A596030}" type="datetimeFigureOut">
               <a:rPr lang="en-US" smtClean="0"/>
-              <a:t>2/20/19</a:t>
+              <a:t>25-Feb-19</a:t>
             </a:fld>
             <a:endParaRPr lang="en-US"/>
           </a:p>
@@ -1426,7 +1424,7 @@
           <a:p>
             <a:fld id="{04F1D4A2-813C-F741-B481-C92B3A596030}" type="datetimeFigureOut">
               <a:rPr lang="en-US" smtClean="0"/>
-              <a:t>2/20/19</a:t>
+              <a:t>25-Feb-19</a:t>
             </a:fld>
             <a:endParaRPr lang="en-US"/>
           </a:p>
@@ -1655,7 +1653,7 @@
           <a:p>
             <a:fld id="{04F1D4A2-813C-F741-B481-C92B3A596030}" type="datetimeFigureOut">
               <a:rPr lang="en-US" smtClean="0"/>
-              <a:t>2/20/19</a:t>
+              <a:t>25-Feb-19</a:t>
             </a:fld>
             <a:endParaRPr lang="en-US"/>
           </a:p>
@@ -2019,7 +2017,7 @@
           <a:p>
             <a:fld id="{04F1D4A2-813C-F741-B481-C92B3A596030}" type="datetimeFigureOut">
               <a:rPr lang="en-US" smtClean="0"/>
-              <a:t>2/20/19</a:t>
+              <a:t>25-Feb-19</a:t>
             </a:fld>
             <a:endParaRPr lang="en-US"/>
           </a:p>
@@ -2136,7 +2134,7 @@
           <a:p>
             <a:fld id="{04F1D4A2-813C-F741-B481-C92B3A596030}" type="datetimeFigureOut">
               <a:rPr lang="en-US" smtClean="0"/>
-              <a:t>2/20/19</a:t>
+              <a:t>25-Feb-19</a:t>
             </a:fld>
             <a:endParaRPr lang="en-US"/>
           </a:p>
@@ -2231,7 +2229,7 @@
           <a:p>
             <a:fld id="{04F1D4A2-813C-F741-B481-C92B3A596030}" type="datetimeFigureOut">
               <a:rPr lang="en-US" smtClean="0"/>
-              <a:t>2/20/19</a:t>
+              <a:t>25-Feb-19</a:t>
             </a:fld>
             <a:endParaRPr lang="en-US"/>
           </a:p>
@@ -2506,7 +2504,7 @@
           <a:p>
             <a:fld id="{04F1D4A2-813C-F741-B481-C92B3A596030}" type="datetimeFigureOut">
               <a:rPr lang="en-US" smtClean="0"/>
-              <a:t>2/20/19</a:t>
+              <a:t>25-Feb-19</a:t>
             </a:fld>
             <a:endParaRPr lang="en-US"/>
           </a:p>
@@ -2758,7 +2756,7 @@
           <a:p>
             <a:fld id="{04F1D4A2-813C-F741-B481-C92B3A596030}" type="datetimeFigureOut">
               <a:rPr lang="en-US" smtClean="0"/>
-              <a:t>2/20/19</a:t>
+              <a:t>25-Feb-19</a:t>
             </a:fld>
             <a:endParaRPr lang="en-US"/>
           </a:p>
@@ -2969,7 +2967,7 @@
           <a:p>
             <a:fld id="{04F1D4A2-813C-F741-B481-C92B3A596030}" type="datetimeFigureOut">
               <a:rPr lang="en-US" smtClean="0"/>
-              <a:t>2/20/19</a:t>
+              <a:t>25-Feb-19</a:t>
             </a:fld>
             <a:endParaRPr lang="en-US"/>
           </a:p>
@@ -3412,6 +3410,10 @@
             <a:br>
               <a:rPr lang="en-US" dirty="0"/>
             </a:br>
+            <a:r>
+              <a:rPr lang="en-US" dirty="0"/>
+              <a:t/>
+            </a:r>
             <a:br>
               <a:rPr lang="en-US" dirty="0"/>
             </a:br>
@@ -10778,13 +10780,103 @@
           </a:xfrm>
         </p:spPr>
         <p:txBody>
-          <a:bodyPr/>
-          <a:lstStyle/>
-          <a:p>
-            <a:r>
-              <a:rPr lang="en-US" dirty="0"/>
-              <a:t>TODO</a:t>
-            </a:r>
+          <a:bodyPr>
+            <a:normAutofit fontScale="92500" lnSpcReduction="10000"/>
+          </a:bodyPr>
+          <a:lstStyle/>
+          <a:p>
+            <a:r>
+              <a:rPr lang="en-US" dirty="0" smtClean="0"/>
+              <a:t>In JSF, there are 2 main ways for navigation</a:t>
+            </a:r>
+          </a:p>
+          <a:p>
+            <a:r>
+              <a:rPr lang="en-US" b="1" dirty="0" smtClean="0"/>
+              <a:t>Forward</a:t>
+            </a:r>
+            <a:r>
+              <a:rPr lang="en-US" dirty="0" smtClean="0"/>
+              <a:t>: return the rendered HTML of the linked-page as part of the body payload of the POST request</a:t>
+            </a:r>
+          </a:p>
+          <a:p>
+            <a:pPr lvl="1"/>
+            <a:r>
+              <a:rPr lang="en-US" dirty="0" smtClean="0"/>
+              <a:t>this is the default behavior</a:t>
+            </a:r>
+          </a:p>
+          <a:p>
+            <a:pPr lvl="1"/>
+            <a:r>
+              <a:rPr lang="en-US" dirty="0" smtClean="0"/>
+              <a:t>issue: the URL on address bar in browser does NOT change</a:t>
+            </a:r>
+          </a:p>
+          <a:p>
+            <a:r>
+              <a:rPr lang="en-US" b="1" dirty="0" smtClean="0"/>
+              <a:t>Redirect</a:t>
+            </a:r>
+            <a:r>
+              <a:rPr lang="en-US" dirty="0" smtClean="0"/>
+              <a:t>: return a 302 redirection, where path returned by “</a:t>
+            </a:r>
+            <a:r>
+              <a:rPr lang="en-US" i="1" dirty="0" smtClean="0"/>
+              <a:t>action</a:t>
+            </a:r>
+            <a:r>
+              <a:rPr lang="en-US" dirty="0" smtClean="0"/>
+              <a:t>” will be in the </a:t>
+            </a:r>
+            <a:r>
+              <a:rPr lang="en-US" i="1" dirty="0" smtClean="0"/>
+              <a:t>Location</a:t>
+            </a:r>
+            <a:r>
+              <a:rPr lang="en-US" dirty="0" smtClean="0"/>
+              <a:t> HTTP header</a:t>
+            </a:r>
+          </a:p>
+          <a:p>
+            <a:pPr lvl="1"/>
+            <a:r>
+              <a:rPr lang="en-US" dirty="0" smtClean="0"/>
+              <a:t>issue: browser will need to make 2 calls (first the POST, and then a GET), but the address bar will be updated correctly</a:t>
+            </a:r>
+          </a:p>
+          <a:p>
+            <a:pPr lvl="1"/>
+            <a:r>
+              <a:rPr lang="en-US" dirty="0" smtClean="0"/>
+              <a:t>needs to be activated with </a:t>
+            </a:r>
+            <a:r>
+              <a:rPr lang="en-US" dirty="0"/>
+              <a:t>URL attribute: </a:t>
+            </a:r>
+            <a:r>
+              <a:rPr lang="en-US" dirty="0" smtClean="0"/>
+              <a:t>“</a:t>
+            </a:r>
+            <a:r>
+              <a:rPr lang="en-US" b="1" dirty="0" smtClean="0"/>
+              <a:t>?faces-redirect=true</a:t>
+            </a:r>
+            <a:r>
+              <a:rPr lang="en-US" dirty="0" smtClean="0"/>
+              <a:t>”</a:t>
+            </a:r>
+          </a:p>
+          <a:p>
+            <a:pPr lvl="1"/>
+            <a:r>
+              <a:rPr lang="en-US" dirty="0" smtClean="0"/>
+              <a:t>this is the one you should use most of the time</a:t>
+            </a:r>
+            <a:endParaRPr lang="en-US" dirty="0"/>
           </a:p>
         </p:txBody>
       </p:sp>
@@ -10909,13 +11001,7 @@
       </p:grpSpPr>
       <p:sp>
         <p:nvSpPr>
-          <p:cNvPr id="4" name="Title 3">
-            <a:extLst>
-              <a:ext uri="{FF2B5EF4-FFF2-40B4-BE49-F238E27FC236}">
-                <a16:creationId xmlns:a16="http://schemas.microsoft.com/office/drawing/2014/main" id="{CD6F25EF-94EE-7449-B93B-F0A83A830C79}"/>
-              </a:ext>
-            </a:extLst>
-          </p:cNvPr>
+          <p:cNvPr id="2" name="Title 1"/>
           <p:cNvSpPr>
             <a:spLocks noGrp="1"/>
           </p:cNvSpPr>
@@ -10923,47 +11009,27 @@
             <p:ph type="title"/>
           </p:nvPr>
         </p:nvSpPr>
-        <p:spPr/>
+        <p:spPr>
+          <a:xfrm>
+            <a:off x="838200" y="3002307"/>
+            <a:ext cx="10515600" cy="1325563"/>
+          </a:xfrm>
+        </p:spPr>
         <p:txBody>
           <a:bodyPr/>
           <a:lstStyle/>
           <a:p>
             <a:r>
               <a:rPr lang="en-US" dirty="0"/>
-              <a:t>Handling Multi-Users</a:t>
-            </a:r>
-          </a:p>
-        </p:txBody>
-      </p:sp>
-      <p:sp>
-        <p:nvSpPr>
-          <p:cNvPr id="5" name="Text Placeholder 4">
-            <a:extLst>
-              <a:ext uri="{FF2B5EF4-FFF2-40B4-BE49-F238E27FC236}">
-                <a16:creationId xmlns:a16="http://schemas.microsoft.com/office/drawing/2014/main" id="{59E9AA0E-0EC5-8E4F-ABBF-588409A91420}"/>
-              </a:ext>
-            </a:extLst>
-          </p:cNvPr>
-          <p:cNvSpPr>
-            <a:spLocks noGrp="1"/>
-          </p:cNvSpPr>
-          <p:nvPr>
-            <p:ph type="body" idx="1"/>
-          </p:nvPr>
-        </p:nvSpPr>
-        <p:spPr/>
-        <p:txBody>
-          <a:bodyPr/>
-          <a:lstStyle/>
-          <a:p>
-            <a:endParaRPr lang="en-US"/>
+              <a:t>Docker</a:t>
+            </a:r>
           </a:p>
         </p:txBody>
       </p:sp>
     </p:spTree>
     <p:extLst>
       <p:ext uri="{BB962C8B-B14F-4D97-AF65-F5344CB8AC3E}">
-        <p14:creationId xmlns:p14="http://schemas.microsoft.com/office/powerpoint/2010/main" val="1921544514"/>
+        <p14:creationId xmlns:p14="http://schemas.microsoft.com/office/powerpoint/2010/main" val="3402842063"/>
       </p:ext>
     </p:extLst>
   </p:cSld>
@@ -10992,146 +11058,6 @@
       </p:grpSpPr>
       <p:sp>
         <p:nvSpPr>
-          <p:cNvPr id="2" name="Title 1">
-            <a:extLst>
-              <a:ext uri="{FF2B5EF4-FFF2-40B4-BE49-F238E27FC236}">
-                <a16:creationId xmlns:a16="http://schemas.microsoft.com/office/drawing/2014/main" id="{B5EB1F9E-A513-4346-BE81-83979C92C6A8}"/>
-              </a:ext>
-            </a:extLst>
-          </p:cNvPr>
-          <p:cNvSpPr>
-            <a:spLocks noGrp="1"/>
-          </p:cNvSpPr>
-          <p:nvPr>
-            <p:ph type="title"/>
-          </p:nvPr>
-        </p:nvSpPr>
-        <p:spPr/>
-        <p:txBody>
-          <a:bodyPr/>
-          <a:lstStyle/>
-          <a:p>
-            <a:endParaRPr lang="en-US"/>
-          </a:p>
-        </p:txBody>
-      </p:sp>
-      <p:sp>
-        <p:nvSpPr>
-          <p:cNvPr id="3" name="Content Placeholder 2">
-            <a:extLst>
-              <a:ext uri="{FF2B5EF4-FFF2-40B4-BE49-F238E27FC236}">
-                <a16:creationId xmlns:a16="http://schemas.microsoft.com/office/drawing/2014/main" id="{41DD1CCD-47F8-DA42-B609-62850DFC4701}"/>
-              </a:ext>
-            </a:extLst>
-          </p:cNvPr>
-          <p:cNvSpPr>
-            <a:spLocks noGrp="1"/>
-          </p:cNvSpPr>
-          <p:nvPr>
-            <p:ph idx="1"/>
-          </p:nvPr>
-        </p:nvSpPr>
-        <p:spPr/>
-        <p:txBody>
-          <a:bodyPr/>
-          <a:lstStyle/>
-          <a:p>
-            <a:r>
-              <a:rPr lang="en-US" dirty="0"/>
-              <a:t>TODO</a:t>
-            </a:r>
-          </a:p>
-        </p:txBody>
-      </p:sp>
-    </p:spTree>
-    <p:extLst>
-      <p:ext uri="{BB962C8B-B14F-4D97-AF65-F5344CB8AC3E}">
-        <p14:creationId xmlns:p14="http://schemas.microsoft.com/office/powerpoint/2010/main" val="3431773831"/>
-      </p:ext>
-    </p:extLst>
-  </p:cSld>
-  <p:clrMapOvr>
-    <a:masterClrMapping/>
-  </p:clrMapOvr>
-</p:sld>
-</file>
-
-<file path=ppt/slides/slide52.xml><?xml version="1.0" encoding="utf-8"?>
-<p:sld xmlns:a="http://schemas.openxmlformats.org/drawingml/2006/main" xmlns:r="http://schemas.openxmlformats.org/officeDocument/2006/relationships" xmlns:p="http://schemas.openxmlformats.org/presentationml/2006/main">
-  <p:cSld>
-    <p:spTree>
-      <p:nvGrpSpPr>
-        <p:cNvPr id="1" name=""/>
-        <p:cNvGrpSpPr/>
-        <p:nvPr/>
-      </p:nvGrpSpPr>
-      <p:grpSpPr>
-        <a:xfrm>
-          <a:off x="0" y="0"/>
-          <a:ext cx="0" cy="0"/>
-          <a:chOff x="0" y="0"/>
-          <a:chExt cx="0" cy="0"/>
-        </a:xfrm>
-      </p:grpSpPr>
-      <p:sp>
-        <p:nvSpPr>
-          <p:cNvPr id="2" name="Title 1"/>
-          <p:cNvSpPr>
-            <a:spLocks noGrp="1"/>
-          </p:cNvSpPr>
-          <p:nvPr>
-            <p:ph type="title"/>
-          </p:nvPr>
-        </p:nvSpPr>
-        <p:spPr>
-          <a:xfrm>
-            <a:off x="838200" y="3002307"/>
-            <a:ext cx="10515600" cy="1325563"/>
-          </a:xfrm>
-        </p:spPr>
-        <p:txBody>
-          <a:bodyPr/>
-          <a:lstStyle/>
-          <a:p>
-            <a:r>
-              <a:rPr lang="en-US" dirty="0"/>
-              <a:t>Docker</a:t>
-            </a:r>
-          </a:p>
-        </p:txBody>
-      </p:sp>
-    </p:spTree>
-    <p:extLst>
-      <p:ext uri="{BB962C8B-B14F-4D97-AF65-F5344CB8AC3E}">
-        <p14:creationId xmlns:p14="http://schemas.microsoft.com/office/powerpoint/2010/main" val="3402842063"/>
-      </p:ext>
-    </p:extLst>
-  </p:cSld>
-  <p:clrMapOvr>
-    <a:masterClrMapping/>
-  </p:clrMapOvr>
-</p:sld>
-</file>
-
-<file path=ppt/slides/slide53.xml><?xml version="1.0" encoding="utf-8"?>
-<p:sld xmlns:a="http://schemas.openxmlformats.org/drawingml/2006/main" xmlns:r="http://schemas.openxmlformats.org/officeDocument/2006/relationships" xmlns:p="http://schemas.openxmlformats.org/presentationml/2006/main">
-  <p:cSld>
-    <p:spTree>
-      <p:nvGrpSpPr>
-        <p:cNvPr id="1" name=""/>
-        <p:cNvGrpSpPr/>
-        <p:nvPr/>
-      </p:nvGrpSpPr>
-      <p:grpSpPr>
-        <a:xfrm>
-          <a:off x="0" y="0"/>
-          <a:ext cx="0" cy="0"/>
-          <a:chOff x="0" y="0"/>
-          <a:chExt cx="0" cy="0"/>
-        </a:xfrm>
-      </p:grpSpPr>
-      <p:sp>
-        <p:nvSpPr>
           <p:cNvPr id="2" name="Title 1"/>
           <p:cNvSpPr>
             <a:spLocks noGrp="1"/>
@@ -11284,7 +11210,7 @@
 </p:sld>
 </file>
 
-<file path=ppt/slides/slide54.xml><?xml version="1.0" encoding="utf-8"?>
+<file path=ppt/slides/slide52.xml><?xml version="1.0" encoding="utf-8"?>
 <p:sld xmlns:a="http://schemas.openxmlformats.org/drawingml/2006/main" xmlns:r="http://schemas.openxmlformats.org/officeDocument/2006/relationships" xmlns:p="http://schemas.openxmlformats.org/presentationml/2006/main">
   <p:cSld>
     <p:spTree>
@@ -11450,7 +11376,7 @@
 </p:sld>
 </file>
 
-<file path=ppt/slides/slide55.xml><?xml version="1.0" encoding="utf-8"?>
+<file path=ppt/slides/slide53.xml><?xml version="1.0" encoding="utf-8"?>
 <p:sld xmlns:a="http://schemas.openxmlformats.org/drawingml/2006/main" xmlns:r="http://schemas.openxmlformats.org/officeDocument/2006/relationships" xmlns:p="http://schemas.openxmlformats.org/presentationml/2006/main">
   <p:cSld>
     <p:spTree>
@@ -11630,7 +11556,7 @@
 </p:sld>
 </file>
 
-<file path=ppt/slides/slide56.xml><?xml version="1.0" encoding="utf-8"?>
+<file path=ppt/slides/slide54.xml><?xml version="1.0" encoding="utf-8"?>
 <p:sld xmlns:a="http://schemas.openxmlformats.org/drawingml/2006/main" xmlns:r="http://schemas.openxmlformats.org/officeDocument/2006/relationships" xmlns:p="http://schemas.openxmlformats.org/presentationml/2006/main">
   <p:cSld>
     <p:spTree>
@@ -11747,15 +11673,15 @@
               <a:t>This will install the image “</a:t>
             </a:r>
             <a:r>
-              <a:rPr lang="en-US" dirty="0" err="1"/>
+              <a:rPr lang="en-US" i="1" dirty="0" err="1"/>
               <a:t>docker</a:t>
             </a:r>
             <a:r>
-              <a:rPr lang="en-US" dirty="0"/>
+              <a:rPr lang="en-US" i="1" dirty="0"/>
               <a:t>/</a:t>
             </a:r>
             <a:r>
-              <a:rPr lang="en-US" dirty="0" err="1"/>
+              <a:rPr lang="en-US" i="1" dirty="0" err="1"/>
               <a:t>whalesay</a:t>
             </a:r>
             <a:r>
@@ -11778,15 +11704,15 @@
               <a:t>First time you run it, the “</a:t>
             </a:r>
             <a:r>
-              <a:rPr lang="en-US" dirty="0" err="1"/>
+              <a:rPr lang="en-US" i="1" dirty="0" err="1"/>
               <a:t>docker</a:t>
             </a:r>
             <a:r>
-              <a:rPr lang="en-US" dirty="0"/>
+              <a:rPr lang="en-US" i="1" dirty="0"/>
               <a:t>/</a:t>
             </a:r>
             <a:r>
-              <a:rPr lang="en-US" dirty="0" err="1"/>
+              <a:rPr lang="en-US" i="1" dirty="0" err="1"/>
               <a:t>whalesay</a:t>
             </a:r>
             <a:r>
@@ -11812,7 +11738,7 @@
 </p:sld>
 </file>
 
-<file path=ppt/slides/slide57.xml><?xml version="1.0" encoding="utf-8"?>
+<file path=ppt/slides/slide55.xml><?xml version="1.0" encoding="utf-8"?>
 <p:sld xmlns:a="http://schemas.openxmlformats.org/drawingml/2006/main" xmlns:r="http://schemas.openxmlformats.org/officeDocument/2006/relationships" xmlns:p="http://schemas.openxmlformats.org/presentationml/2006/main">
   <p:cSld>
     <p:spTree>
@@ -11872,7 +11798,7 @@
 </p:sld>
 </file>
 
-<file path=ppt/slides/slide58.xml><?xml version="1.0" encoding="utf-8"?>
+<file path=ppt/slides/slide56.xml><?xml version="1.0" encoding="utf-8"?>
 <p:sld xmlns:a="http://schemas.openxmlformats.org/drawingml/2006/main" xmlns:r="http://schemas.openxmlformats.org/officeDocument/2006/relationships" xmlns:p="http://schemas.openxmlformats.org/presentationml/2006/main">
   <p:cSld>
     <p:spTree>
@@ -12021,7 +11947,11 @@
             <a:pPr lvl="1"/>
             <a:r>
               <a:rPr lang="en-US" dirty="0"/>
-              <a:t>Note, there is also a </a:t>
+              <a:t>Note, there is also </a:t>
+            </a:r>
+            <a:r>
+              <a:rPr lang="en-US" dirty="0" smtClean="0"/>
+              <a:t>an </a:t>
             </a:r>
             <a:r>
               <a:rPr lang="en-US" b="1" dirty="0"/>
@@ -12082,7 +12012,7 @@
 </p:sld>
 </file>
 
-<file path=ppt/slides/slide59.xml><?xml version="1.0" encoding="utf-8"?>
+<file path=ppt/slides/slide57.xml><?xml version="1.0" encoding="utf-8"?>
 <p:sld xmlns:a="http://schemas.openxmlformats.org/drawingml/2006/main" xmlns:r="http://schemas.openxmlformats.org/officeDocument/2006/relationships" xmlns:p="http://schemas.openxmlformats.org/presentationml/2006/main">
   <p:cSld>
     <p:spTree>
@@ -12142,6 +12072,331 @@
 </p:sld>
 </file>
 
+<file path=ppt/slides/slide58.xml><?xml version="1.0" encoding="utf-8"?>
+<p:sld xmlns:a="http://schemas.openxmlformats.org/drawingml/2006/main" xmlns:r="http://schemas.openxmlformats.org/officeDocument/2006/relationships" xmlns:p="http://schemas.openxmlformats.org/presentationml/2006/main">
+  <p:cSld>
+    <p:spTree>
+      <p:nvGrpSpPr>
+        <p:cNvPr id="1" name=""/>
+        <p:cNvGrpSpPr/>
+        <p:nvPr/>
+      </p:nvGrpSpPr>
+      <p:grpSpPr>
+        <a:xfrm>
+          <a:off x="0" y="0"/>
+          <a:ext cx="0" cy="0"/>
+          <a:chOff x="0" y="0"/>
+          <a:chExt cx="0" cy="0"/>
+        </a:xfrm>
+      </p:grpSpPr>
+      <p:sp>
+        <p:nvSpPr>
+          <p:cNvPr id="2" name="Title 1"/>
+          <p:cNvSpPr>
+            <a:spLocks noGrp="1"/>
+          </p:cNvSpPr>
+          <p:nvPr>
+            <p:ph type="title"/>
+          </p:nvPr>
+        </p:nvSpPr>
+        <p:spPr/>
+        <p:txBody>
+          <a:bodyPr/>
+          <a:lstStyle/>
+          <a:p>
+            <a:r>
+              <a:rPr lang="en-US" dirty="0"/>
+              <a:t>Docker Commands</a:t>
+            </a:r>
+          </a:p>
+        </p:txBody>
+      </p:sp>
+      <p:sp>
+        <p:nvSpPr>
+          <p:cNvPr id="3" name="Content Placeholder 2"/>
+          <p:cNvSpPr>
+            <a:spLocks noGrp="1"/>
+          </p:cNvSpPr>
+          <p:nvPr>
+            <p:ph idx="1"/>
+          </p:nvPr>
+        </p:nvSpPr>
+        <p:spPr>
+          <a:xfrm>
+            <a:off x="265043" y="1825625"/>
+            <a:ext cx="11794435" cy="4932984"/>
+          </a:xfrm>
+        </p:spPr>
+        <p:txBody>
+          <a:bodyPr>
+            <a:normAutofit fontScale="92500"/>
+          </a:bodyPr>
+          <a:lstStyle/>
+          <a:p>
+            <a:r>
+              <a:rPr lang="en-US" b="1" i="1" dirty="0" err="1"/>
+              <a:t>docker</a:t>
+            </a:r>
+            <a:r>
+              <a:rPr lang="en-US" b="1" i="1" dirty="0"/>
+              <a:t> build -t &lt;name&gt; .</a:t>
+            </a:r>
+          </a:p>
+          <a:p>
+            <a:pPr lvl="1"/>
+            <a:r>
+              <a:rPr lang="en-US" dirty="0"/>
+              <a:t>Create an image with name &lt;</a:t>
+            </a:r>
+            <a:r>
+              <a:rPr lang="en-US" i="1" dirty="0"/>
+              <a:t>name</a:t>
+            </a:r>
+            <a:r>
+              <a:rPr lang="en-US" dirty="0"/>
+              <a:t>&gt;, from the </a:t>
+            </a:r>
+            <a:r>
+              <a:rPr lang="en-US" i="1" dirty="0" err="1"/>
+              <a:t>Dockerfile</a:t>
+            </a:r>
+            <a:r>
+              <a:rPr lang="en-US" dirty="0"/>
+              <a:t> in the current “.” folder</a:t>
+            </a:r>
+          </a:p>
+          <a:p>
+            <a:r>
+              <a:rPr lang="en-US" b="1" i="1" dirty="0" err="1"/>
+              <a:t>docker</a:t>
+            </a:r>
+            <a:r>
+              <a:rPr lang="en-US" b="1" i="1" dirty="0"/>
+              <a:t> run &lt;name&gt;</a:t>
+            </a:r>
+          </a:p>
+          <a:p>
+            <a:pPr lvl="1"/>
+            <a:r>
+              <a:rPr lang="en-US" dirty="0"/>
+              <a:t>Run the given image</a:t>
+            </a:r>
+          </a:p>
+          <a:p>
+            <a:r>
+              <a:rPr lang="en-US" b="1" dirty="0" err="1"/>
+              <a:t>docker</a:t>
+            </a:r>
+            <a:r>
+              <a:rPr lang="en-US" b="1" dirty="0"/>
+              <a:t> </a:t>
+            </a:r>
+            <a:r>
+              <a:rPr lang="en-US" b="1" dirty="0" err="1"/>
+              <a:t>ps</a:t>
+            </a:r>
+            <a:endParaRPr lang="en-US" b="1" dirty="0"/>
+          </a:p>
+          <a:p>
+            <a:pPr lvl="1"/>
+            <a:r>
+              <a:rPr lang="en-US" dirty="0"/>
+              <a:t>Show running images</a:t>
+            </a:r>
+          </a:p>
+          <a:p>
+            <a:r>
+              <a:rPr lang="en-US" b="1" dirty="0" err="1"/>
+              <a:t>docker</a:t>
+            </a:r>
+            <a:r>
+              <a:rPr lang="en-US" b="1" dirty="0"/>
+              <a:t> stop &lt;id&gt;</a:t>
+            </a:r>
+          </a:p>
+          <a:p>
+            <a:pPr lvl="1"/>
+            <a:r>
+              <a:rPr lang="en-US" dirty="0"/>
+              <a:t>Stop the given running image. Note: an image can be run in several instances, with different ids</a:t>
+            </a:r>
+          </a:p>
+          <a:p>
+            <a:r>
+              <a:rPr lang="en-US" dirty="0"/>
+              <a:t>In IntelliJ, you can also install “</a:t>
+            </a:r>
+            <a:r>
+              <a:rPr lang="en-US" i="1" dirty="0"/>
+              <a:t>Docker integration</a:t>
+            </a:r>
+            <a:r>
+              <a:rPr lang="en-US" dirty="0"/>
+              <a:t>” plugin</a:t>
+            </a:r>
+          </a:p>
+          <a:p>
+            <a:endParaRPr lang="en-US" dirty="0"/>
+          </a:p>
+        </p:txBody>
+      </p:sp>
+    </p:spTree>
+    <p:extLst>
+      <p:ext uri="{BB962C8B-B14F-4D97-AF65-F5344CB8AC3E}">
+        <p14:creationId xmlns:p14="http://schemas.microsoft.com/office/powerpoint/2010/main" val="3257655982"/>
+      </p:ext>
+    </p:extLst>
+  </p:cSld>
+  <p:clrMapOvr>
+    <a:masterClrMapping/>
+  </p:clrMapOvr>
+</p:sld>
+</file>
+
+<file path=ppt/slides/slide59.xml><?xml version="1.0" encoding="utf-8"?>
+<p:sld xmlns:a="http://schemas.openxmlformats.org/drawingml/2006/main" xmlns:r="http://schemas.openxmlformats.org/officeDocument/2006/relationships" xmlns:p="http://schemas.openxmlformats.org/presentationml/2006/main">
+  <p:cSld>
+    <p:spTree>
+      <p:nvGrpSpPr>
+        <p:cNvPr id="1" name=""/>
+        <p:cNvGrpSpPr/>
+        <p:nvPr/>
+      </p:nvGrpSpPr>
+      <p:grpSpPr>
+        <a:xfrm>
+          <a:off x="0" y="0"/>
+          <a:ext cx="0" cy="0"/>
+          <a:chOff x="0" y="0"/>
+          <a:chExt cx="0" cy="0"/>
+        </a:xfrm>
+      </p:grpSpPr>
+      <p:sp>
+        <p:nvSpPr>
+          <p:cNvPr id="2" name="Title 1"/>
+          <p:cNvSpPr>
+            <a:spLocks noGrp="1"/>
+          </p:cNvSpPr>
+          <p:nvPr>
+            <p:ph type="title"/>
+          </p:nvPr>
+        </p:nvSpPr>
+        <p:spPr/>
+        <p:txBody>
+          <a:bodyPr/>
+          <a:lstStyle/>
+          <a:p>
+            <a:r>
+              <a:rPr lang="en-US" dirty="0"/>
+              <a:t>Networking</a:t>
+            </a:r>
+          </a:p>
+        </p:txBody>
+      </p:sp>
+      <p:sp>
+        <p:nvSpPr>
+          <p:cNvPr id="3" name="Content Placeholder 2"/>
+          <p:cNvSpPr>
+            <a:spLocks noGrp="1"/>
+          </p:cNvSpPr>
+          <p:nvPr>
+            <p:ph idx="1"/>
+          </p:nvPr>
+        </p:nvSpPr>
+        <p:spPr>
+          <a:xfrm>
+            <a:off x="259975" y="1825624"/>
+            <a:ext cx="11761695" cy="4906869"/>
+          </a:xfrm>
+        </p:spPr>
+        <p:txBody>
+          <a:bodyPr/>
+          <a:lstStyle/>
+          <a:p>
+            <a:r>
+              <a:rPr lang="en-US" dirty="0"/>
+              <a:t>When you run a server on your local host, it will open a TCP port, typically 80 or 8080</a:t>
+            </a:r>
+          </a:p>
+          <a:p>
+            <a:r>
+              <a:rPr lang="en-US" dirty="0"/>
+              <a:t>A server running inside Docker will open the same kind of ports, but those will not be visible from the </a:t>
+            </a:r>
+            <a:r>
+              <a:rPr lang="en-US" i="1" dirty="0"/>
+              <a:t>host</a:t>
+            </a:r>
+            <a:r>
+              <a:rPr lang="en-US" dirty="0"/>
+              <a:t> OS</a:t>
+            </a:r>
+          </a:p>
+          <a:p>
+            <a:r>
+              <a:rPr lang="en-US" dirty="0"/>
+              <a:t>You need to explicitly make a mapping from </a:t>
+            </a:r>
+            <a:r>
+              <a:rPr lang="en-US" i="1" dirty="0"/>
+              <a:t>host </a:t>
+            </a:r>
+            <a:r>
+              <a:rPr lang="en-US" dirty="0"/>
+              <a:t>to </a:t>
+            </a:r>
+            <a:r>
+              <a:rPr lang="en-US" i="1" dirty="0"/>
+              <a:t>guest</a:t>
+            </a:r>
+            <a:r>
+              <a:rPr lang="en-US" dirty="0"/>
+              <a:t> ports</a:t>
+            </a:r>
+          </a:p>
+          <a:p>
+            <a:r>
+              <a:rPr lang="en-US" dirty="0"/>
+              <a:t>Ex.: </a:t>
+            </a:r>
+            <a:r>
+              <a:rPr lang="en-US" b="1" dirty="0" err="1"/>
+              <a:t>docker</a:t>
+            </a:r>
+            <a:r>
+              <a:rPr lang="en-US" b="1" dirty="0"/>
+              <a:t> run </a:t>
+            </a:r>
+            <a:r>
+              <a:rPr lang="mr-IN" b="1" dirty="0"/>
+              <a:t>–</a:t>
+            </a:r>
+            <a:r>
+              <a:rPr lang="en-US" b="1" dirty="0"/>
+              <a:t>p 80:8080 foo</a:t>
+            </a:r>
+          </a:p>
+          <a:p>
+            <a:pPr lvl="1"/>
+            <a:r>
+              <a:rPr lang="en-US" dirty="0"/>
+              <a:t>When we do a connection on localhost on port 80, it will be redirected to 8080 inside Docker</a:t>
+            </a:r>
+          </a:p>
+        </p:txBody>
+      </p:sp>
+    </p:spTree>
+    <p:extLst>
+      <p:ext uri="{BB962C8B-B14F-4D97-AF65-F5344CB8AC3E}">
+        <p14:creationId xmlns:p14="http://schemas.microsoft.com/office/powerpoint/2010/main" val="827690505"/>
+      </p:ext>
+    </p:extLst>
+  </p:cSld>
+  <p:clrMapOvr>
+    <a:masterClrMapping/>
+  </p:clrMapOvr>
+</p:sld>
+</file>
+
 <file path=ppt/slides/slide6.xml><?xml version="1.0" encoding="utf-8"?>
 <p:sld xmlns:a="http://schemas.openxmlformats.org/drawingml/2006/main" xmlns:r="http://schemas.openxmlformats.org/officeDocument/2006/relationships" xmlns:p="http://schemas.openxmlformats.org/presentationml/2006/main">
   <p:cSld>
@@ -12327,7 +12582,7 @@
           <a:p>
             <a:r>
               <a:rPr lang="en-US" dirty="0"/>
-              <a:t>Docker Commands</a:t>
+              <a:t>CTRL-C</a:t>
             </a:r>
           </a:p>
         </p:txBody>
@@ -12344,119 +12599,119 @@
         </p:nvSpPr>
         <p:spPr>
           <a:xfrm>
-            <a:off x="265043" y="1825625"/>
-            <a:ext cx="11794435" cy="4932984"/>
+            <a:off x="243347" y="1825625"/>
+            <a:ext cx="11769213" cy="4899640"/>
           </a:xfrm>
         </p:spPr>
         <p:txBody>
-          <a:bodyPr>
-            <a:normAutofit fontScale="92500"/>
-          </a:bodyPr>
-          <a:lstStyle/>
-          <a:p>
-            <a:r>
-              <a:rPr lang="en-US" b="1" i="1" dirty="0" err="1"/>
+          <a:bodyPr/>
+          <a:lstStyle/>
+          <a:p>
+            <a:r>
+              <a:rPr lang="en-US" dirty="0"/>
+              <a:t>When running Docker (</a:t>
+            </a:r>
+            <a:r>
+              <a:rPr lang="en-US" dirty="0" err="1"/>
+              <a:t>eg</a:t>
+            </a:r>
+            <a:r>
+              <a:rPr lang="en-US" dirty="0"/>
+              <a:t> “</a:t>
+            </a:r>
+            <a:r>
+              <a:rPr lang="en-US" i="1" dirty="0" err="1"/>
               <a:t>docker</a:t>
             </a:r>
             <a:r>
-              <a:rPr lang="en-US" b="1" i="1" dirty="0"/>
-              <a:t> build -t &lt;name&gt; .</a:t>
-            </a:r>
-          </a:p>
-          <a:p>
-            <a:pPr lvl="1"/>
-            <a:r>
-              <a:rPr lang="en-US" dirty="0"/>
-              <a:t>Create an image with name &lt;</a:t>
-            </a:r>
-            <a:r>
               <a:rPr lang="en-US" i="1" dirty="0"/>
-              <a:t>name</a:t>
-            </a:r>
-            <a:r>
-              <a:rPr lang="en-US" dirty="0"/>
-              <a:t>&gt;, from the </a:t>
+              <a:t> run</a:t>
+            </a:r>
+            <a:r>
+              <a:rPr lang="en-US" dirty="0"/>
+              <a:t>”) in a terminal, you can use CTRL-C to stop it</a:t>
+            </a:r>
+          </a:p>
+          <a:p>
+            <a:r>
+              <a:rPr lang="en-US" dirty="0"/>
+              <a:t>On Windows/</a:t>
+            </a:r>
+            <a:r>
+              <a:rPr lang="en-US" dirty="0" err="1"/>
+              <a:t>GitBash</a:t>
+            </a:r>
+            <a:r>
+              <a:rPr lang="en-US" dirty="0"/>
+              <a:t> it </a:t>
+            </a:r>
+            <a:r>
+              <a:rPr lang="en-US" i="1" dirty="0"/>
+              <a:t>might </a:t>
+            </a:r>
+            <a:r>
+              <a:rPr lang="en-US" dirty="0"/>
+              <a:t>happen that the image still run in background</a:t>
+            </a:r>
+          </a:p>
+          <a:p>
+            <a:r>
+              <a:rPr lang="en-US" dirty="0"/>
+              <a:t>Use “</a:t>
             </a:r>
             <a:r>
               <a:rPr lang="en-US" i="1" dirty="0" err="1"/>
-              <a:t>Dockerfile</a:t>
-            </a:r>
-            <a:r>
-              <a:rPr lang="en-US" dirty="0"/>
-              <a:t> in the current “.” folder</a:t>
-            </a:r>
-          </a:p>
-          <a:p>
-            <a:r>
-              <a:rPr lang="en-US" b="1" i="1" dirty="0" err="1"/>
               <a:t>docker</a:t>
             </a:r>
             <a:r>
-              <a:rPr lang="en-US" b="1" i="1" dirty="0"/>
-              <a:t> run &lt;name&gt;</a:t>
-            </a:r>
-          </a:p>
-          <a:p>
-            <a:pPr lvl="1"/>
-            <a:r>
-              <a:rPr lang="en-US" dirty="0"/>
-              <a:t>Run the given image</a:t>
-            </a:r>
-          </a:p>
-          <a:p>
-            <a:r>
-              <a:rPr lang="en-US" b="1" dirty="0" err="1"/>
+              <a:rPr lang="en-US" i="1" dirty="0"/>
+              <a:t> </a:t>
+            </a:r>
+            <a:r>
+              <a:rPr lang="en-US" i="1" dirty="0" err="1"/>
+              <a:t>ps</a:t>
+            </a:r>
+            <a:r>
+              <a:rPr lang="en-US" dirty="0"/>
+              <a:t>” to check if indeed the case</a:t>
+            </a:r>
+          </a:p>
+          <a:p>
+            <a:r>
+              <a:rPr lang="en-US" dirty="0"/>
+              <a:t>Use “</a:t>
+            </a:r>
+            <a:r>
+              <a:rPr lang="en-US" i="1" dirty="0" err="1"/>
               <a:t>docker</a:t>
             </a:r>
             <a:r>
-              <a:rPr lang="en-US" b="1" dirty="0"/>
-              <a:t> </a:t>
-            </a:r>
-            <a:r>
-              <a:rPr lang="en-US" b="1" dirty="0" err="1"/>
-              <a:t>ps</a:t>
-            </a:r>
-            <a:endParaRPr lang="en-US" b="1" dirty="0"/>
-          </a:p>
-          <a:p>
-            <a:pPr lvl="1"/>
-            <a:r>
-              <a:rPr lang="en-US" dirty="0"/>
-              <a:t>Show running images</a:t>
-            </a:r>
-          </a:p>
-          <a:p>
-            <a:r>
-              <a:rPr lang="en-US" b="1" dirty="0" err="1"/>
-              <a:t>docker</a:t>
-            </a:r>
-            <a:r>
-              <a:rPr lang="en-US" b="1" dirty="0"/>
+              <a:rPr lang="en-US" i="1" dirty="0"/>
               <a:t> stop &lt;id&gt;</a:t>
             </a:r>
-          </a:p>
-          <a:p>
-            <a:pPr lvl="1"/>
-            <a:r>
-              <a:rPr lang="en-US" dirty="0"/>
-              <a:t>Stop the given running image. Note: an image can be run in several instances, with different ids</a:t>
-            </a:r>
-          </a:p>
-          <a:p>
-            <a:r>
-              <a:rPr lang="en-US" dirty="0"/>
-              <a:t>In IntelliJ, you can also install “</a:t>
-            </a:r>
-            <a:r>
-              <a:rPr lang="en-US" i="1" dirty="0"/>
-              <a:t>Docker integration</a:t>
-            </a:r>
-            <a:r>
-              <a:rPr lang="en-US" dirty="0"/>
-              <a:t>” plugin</a:t>
-            </a:r>
-          </a:p>
-          <a:p>
+            <a:r>
+              <a:rPr lang="en-US" dirty="0"/>
+              <a:t>” to stop an image manually</a:t>
+            </a:r>
+          </a:p>
+          <a:p>
+            <a:r>
+              <a:rPr lang="en-US" dirty="0"/>
+              <a:t>If you have Docker images running </a:t>
+            </a:r>
+            <a:r>
+              <a:rPr lang="en-US"/>
+              <a:t>in the background</a:t>
+            </a:r>
+            <a:r>
+              <a:rPr lang="en-US" dirty="0"/>
+              <a:t>, that can be a problem if they use TCP ports  </a:t>
+            </a:r>
+          </a:p>
+          <a:p>
+            <a:pPr marL="0" indent="0">
+              <a:buNone/>
+            </a:pPr>
             <a:endParaRPr lang="en-US" dirty="0"/>
           </a:p>
         </p:txBody>
@@ -12464,7 +12719,7 @@
     </p:spTree>
     <p:extLst>
       <p:ext uri="{BB962C8B-B14F-4D97-AF65-F5344CB8AC3E}">
-        <p14:creationId xmlns:p14="http://schemas.microsoft.com/office/powerpoint/2010/main" val="3257655982"/>
+        <p14:creationId xmlns:p14="http://schemas.microsoft.com/office/powerpoint/2010/main" val="1278498491"/>
       </p:ext>
     </p:extLst>
   </p:cSld>
@@ -12508,331 +12763,6 @@
           <a:p>
             <a:r>
               <a:rPr lang="en-US" dirty="0"/>
-              <a:t>Networking</a:t>
-            </a:r>
-          </a:p>
-        </p:txBody>
-      </p:sp>
-      <p:sp>
-        <p:nvSpPr>
-          <p:cNvPr id="3" name="Content Placeholder 2"/>
-          <p:cNvSpPr>
-            <a:spLocks noGrp="1"/>
-          </p:cNvSpPr>
-          <p:nvPr>
-            <p:ph idx="1"/>
-          </p:nvPr>
-        </p:nvSpPr>
-        <p:spPr>
-          <a:xfrm>
-            <a:off x="259975" y="1825624"/>
-            <a:ext cx="11761695" cy="4906869"/>
-          </a:xfrm>
-        </p:spPr>
-        <p:txBody>
-          <a:bodyPr/>
-          <a:lstStyle/>
-          <a:p>
-            <a:r>
-              <a:rPr lang="en-US" dirty="0"/>
-              <a:t>When you run a server on your local host, it will open a TCP port, typically 80 or 8080</a:t>
-            </a:r>
-          </a:p>
-          <a:p>
-            <a:r>
-              <a:rPr lang="en-US" dirty="0"/>
-              <a:t>A server running inside Docker will open the same kind of ports, but those will not be visible from the </a:t>
-            </a:r>
-            <a:r>
-              <a:rPr lang="en-US" i="1" dirty="0"/>
-              <a:t>host</a:t>
-            </a:r>
-            <a:r>
-              <a:rPr lang="en-US" dirty="0"/>
-              <a:t> OS</a:t>
-            </a:r>
-          </a:p>
-          <a:p>
-            <a:r>
-              <a:rPr lang="en-US" dirty="0"/>
-              <a:t>You need to explicitly make a mapping from </a:t>
-            </a:r>
-            <a:r>
-              <a:rPr lang="en-US" i="1" dirty="0"/>
-              <a:t>host </a:t>
-            </a:r>
-            <a:r>
-              <a:rPr lang="en-US" dirty="0"/>
-              <a:t>to </a:t>
-            </a:r>
-            <a:r>
-              <a:rPr lang="en-US" i="1" dirty="0"/>
-              <a:t>guest</a:t>
-            </a:r>
-            <a:r>
-              <a:rPr lang="en-US" dirty="0"/>
-              <a:t> ports</a:t>
-            </a:r>
-          </a:p>
-          <a:p>
-            <a:r>
-              <a:rPr lang="en-US" dirty="0"/>
-              <a:t>Ex.: </a:t>
-            </a:r>
-            <a:r>
-              <a:rPr lang="en-US" b="1" dirty="0" err="1"/>
-              <a:t>docker</a:t>
-            </a:r>
-            <a:r>
-              <a:rPr lang="en-US" b="1" dirty="0"/>
-              <a:t> run </a:t>
-            </a:r>
-            <a:r>
-              <a:rPr lang="mr-IN" b="1" dirty="0"/>
-              <a:t>–</a:t>
-            </a:r>
-            <a:r>
-              <a:rPr lang="en-US" b="1" dirty="0"/>
-              <a:t>p 80:8080 foo</a:t>
-            </a:r>
-          </a:p>
-          <a:p>
-            <a:pPr lvl="1"/>
-            <a:r>
-              <a:rPr lang="en-US" dirty="0"/>
-              <a:t>When we do a connection on localhost on port 80, it will be redirected to 8080 inside Docker</a:t>
-            </a:r>
-          </a:p>
-        </p:txBody>
-      </p:sp>
-    </p:spTree>
-    <p:extLst>
-      <p:ext uri="{BB962C8B-B14F-4D97-AF65-F5344CB8AC3E}">
-        <p14:creationId xmlns:p14="http://schemas.microsoft.com/office/powerpoint/2010/main" val="827690505"/>
-      </p:ext>
-    </p:extLst>
-  </p:cSld>
-  <p:clrMapOvr>
-    <a:masterClrMapping/>
-  </p:clrMapOvr>
-</p:sld>
-</file>
-
-<file path=ppt/slides/slide62.xml><?xml version="1.0" encoding="utf-8"?>
-<p:sld xmlns:a="http://schemas.openxmlformats.org/drawingml/2006/main" xmlns:r="http://schemas.openxmlformats.org/officeDocument/2006/relationships" xmlns:p="http://schemas.openxmlformats.org/presentationml/2006/main">
-  <p:cSld>
-    <p:spTree>
-      <p:nvGrpSpPr>
-        <p:cNvPr id="1" name=""/>
-        <p:cNvGrpSpPr/>
-        <p:nvPr/>
-      </p:nvGrpSpPr>
-      <p:grpSpPr>
-        <a:xfrm>
-          <a:off x="0" y="0"/>
-          <a:ext cx="0" cy="0"/>
-          <a:chOff x="0" y="0"/>
-          <a:chExt cx="0" cy="0"/>
-        </a:xfrm>
-      </p:grpSpPr>
-      <p:sp>
-        <p:nvSpPr>
-          <p:cNvPr id="2" name="Title 1"/>
-          <p:cNvSpPr>
-            <a:spLocks noGrp="1"/>
-          </p:cNvSpPr>
-          <p:nvPr>
-            <p:ph type="title"/>
-          </p:nvPr>
-        </p:nvSpPr>
-        <p:spPr/>
-        <p:txBody>
-          <a:bodyPr/>
-          <a:lstStyle/>
-          <a:p>
-            <a:r>
-              <a:rPr lang="en-US" dirty="0"/>
-              <a:t>CTRL-C</a:t>
-            </a:r>
-          </a:p>
-        </p:txBody>
-      </p:sp>
-      <p:sp>
-        <p:nvSpPr>
-          <p:cNvPr id="3" name="Content Placeholder 2"/>
-          <p:cNvSpPr>
-            <a:spLocks noGrp="1"/>
-          </p:cNvSpPr>
-          <p:nvPr>
-            <p:ph idx="1"/>
-          </p:nvPr>
-        </p:nvSpPr>
-        <p:spPr>
-          <a:xfrm>
-            <a:off x="243347" y="1825625"/>
-            <a:ext cx="11769213" cy="4899640"/>
-          </a:xfrm>
-        </p:spPr>
-        <p:txBody>
-          <a:bodyPr/>
-          <a:lstStyle/>
-          <a:p>
-            <a:r>
-              <a:rPr lang="en-US" dirty="0"/>
-              <a:t>When running Docker (</a:t>
-            </a:r>
-            <a:r>
-              <a:rPr lang="en-US" dirty="0" err="1"/>
-              <a:t>eg</a:t>
-            </a:r>
-            <a:r>
-              <a:rPr lang="en-US" dirty="0"/>
-              <a:t> “</a:t>
-            </a:r>
-            <a:r>
-              <a:rPr lang="en-US" i="1" dirty="0" err="1"/>
-              <a:t>docker</a:t>
-            </a:r>
-            <a:r>
-              <a:rPr lang="en-US" i="1" dirty="0"/>
-              <a:t> run</a:t>
-            </a:r>
-            <a:r>
-              <a:rPr lang="en-US" dirty="0"/>
-              <a:t>”) in a terminal, you can use CTRL-C to stop it</a:t>
-            </a:r>
-          </a:p>
-          <a:p>
-            <a:r>
-              <a:rPr lang="en-US" dirty="0"/>
-              <a:t>On Windows/</a:t>
-            </a:r>
-            <a:r>
-              <a:rPr lang="en-US" dirty="0" err="1"/>
-              <a:t>GitBash</a:t>
-            </a:r>
-            <a:r>
-              <a:rPr lang="en-US" dirty="0"/>
-              <a:t> it </a:t>
-            </a:r>
-            <a:r>
-              <a:rPr lang="en-US" i="1" dirty="0"/>
-              <a:t>might </a:t>
-            </a:r>
-            <a:r>
-              <a:rPr lang="en-US" dirty="0"/>
-              <a:t>happen that the image still run in background</a:t>
-            </a:r>
-          </a:p>
-          <a:p>
-            <a:r>
-              <a:rPr lang="en-US" dirty="0"/>
-              <a:t>Use “</a:t>
-            </a:r>
-            <a:r>
-              <a:rPr lang="en-US" i="1" dirty="0" err="1"/>
-              <a:t>docker</a:t>
-            </a:r>
-            <a:r>
-              <a:rPr lang="en-US" i="1" dirty="0"/>
-              <a:t> </a:t>
-            </a:r>
-            <a:r>
-              <a:rPr lang="en-US" i="1" dirty="0" err="1"/>
-              <a:t>ps</a:t>
-            </a:r>
-            <a:r>
-              <a:rPr lang="en-US" dirty="0"/>
-              <a:t>” to check if indeed the case</a:t>
-            </a:r>
-          </a:p>
-          <a:p>
-            <a:r>
-              <a:rPr lang="en-US" dirty="0"/>
-              <a:t>Use “</a:t>
-            </a:r>
-            <a:r>
-              <a:rPr lang="en-US" i="1" dirty="0" err="1"/>
-              <a:t>docker</a:t>
-            </a:r>
-            <a:r>
-              <a:rPr lang="en-US" i="1" dirty="0"/>
-              <a:t> stop &lt;id&gt;</a:t>
-            </a:r>
-            <a:r>
-              <a:rPr lang="en-US" dirty="0"/>
-              <a:t>” to stop an image manually</a:t>
-            </a:r>
-          </a:p>
-          <a:p>
-            <a:r>
-              <a:rPr lang="en-US" dirty="0"/>
-              <a:t>If you have Docker images running </a:t>
-            </a:r>
-            <a:r>
-              <a:rPr lang="en-US"/>
-              <a:t>in the background</a:t>
-            </a:r>
-            <a:r>
-              <a:rPr lang="en-US" dirty="0"/>
-              <a:t>, that can be a problem if they use TCP ports  </a:t>
-            </a:r>
-          </a:p>
-          <a:p>
-            <a:pPr marL="0" indent="0">
-              <a:buNone/>
-            </a:pPr>
-            <a:endParaRPr lang="en-US" dirty="0"/>
-          </a:p>
-        </p:txBody>
-      </p:sp>
-    </p:spTree>
-    <p:extLst>
-      <p:ext uri="{BB962C8B-B14F-4D97-AF65-F5344CB8AC3E}">
-        <p14:creationId xmlns:p14="http://schemas.microsoft.com/office/powerpoint/2010/main" val="1278498491"/>
-      </p:ext>
-    </p:extLst>
-  </p:cSld>
-  <p:clrMapOvr>
-    <a:masterClrMapping/>
-  </p:clrMapOvr>
-</p:sld>
-</file>
-
-<file path=ppt/slides/slide63.xml><?xml version="1.0" encoding="utf-8"?>
-<p:sld xmlns:a="http://schemas.openxmlformats.org/drawingml/2006/main" xmlns:r="http://schemas.openxmlformats.org/officeDocument/2006/relationships" xmlns:p="http://schemas.openxmlformats.org/presentationml/2006/main">
-  <p:cSld>
-    <p:spTree>
-      <p:nvGrpSpPr>
-        <p:cNvPr id="1" name=""/>
-        <p:cNvGrpSpPr/>
-        <p:nvPr/>
-      </p:nvGrpSpPr>
-      <p:grpSpPr>
-        <a:xfrm>
-          <a:off x="0" y="0"/>
-          <a:ext cx="0" cy="0"/>
-          <a:chOff x="0" y="0"/>
-          <a:chExt cx="0" cy="0"/>
-        </a:xfrm>
-      </p:grpSpPr>
-      <p:sp>
-        <p:nvSpPr>
-          <p:cNvPr id="2" name="Title 1"/>
-          <p:cNvSpPr>
-            <a:spLocks noGrp="1"/>
-          </p:cNvSpPr>
-          <p:nvPr>
-            <p:ph type="title"/>
-          </p:nvPr>
-        </p:nvSpPr>
-        <p:spPr/>
-        <p:txBody>
-          <a:bodyPr/>
-          <a:lstStyle/>
-          <a:p>
-            <a:r>
-              <a:rPr lang="en-US" dirty="0"/>
               <a:t>Docker in This Course</a:t>
             </a:r>
           </a:p>
@@ -12953,7 +12883,7 @@
 </p:sld>
 </file>
 
-<file path=ppt/slides/slide64.xml><?xml version="1.0" encoding="utf-8"?>
+<file path=ppt/slides/slide62.xml><?xml version="1.0" encoding="utf-8"?>
 <p:sld xmlns:a="http://schemas.openxmlformats.org/drawingml/2006/main" xmlns:r="http://schemas.openxmlformats.org/officeDocument/2006/relationships" xmlns:p="http://schemas.openxmlformats.org/presentationml/2006/main">
   <p:cSld>
     <p:spTree>

</xml_diff>